<commit_message>
user and controller diagram added
</commit_message>
<xml_diff>
--- a/Document/Vehicle Management Presentation.pptx
+++ b/Document/Vehicle Management Presentation.pptx
@@ -13,10 +13,13 @@
     <p:sldId id="264" r:id="rId7"/>
     <p:sldId id="270" r:id="rId8"/>
     <p:sldId id="265" r:id="rId9"/>
-    <p:sldId id="263" r:id="rId10"/>
-    <p:sldId id="267" r:id="rId11"/>
-    <p:sldId id="266" r:id="rId12"/>
-    <p:sldId id="268" r:id="rId13"/>
+    <p:sldId id="273" r:id="rId10"/>
+    <p:sldId id="263" r:id="rId11"/>
+    <p:sldId id="267" r:id="rId12"/>
+    <p:sldId id="266" r:id="rId13"/>
+    <p:sldId id="271" r:id="rId14"/>
+    <p:sldId id="272" r:id="rId15"/>
+    <p:sldId id="268" r:id="rId16"/>
   </p:sldIdLst>
   <p:sldSz cx="12192000" cy="6858000"/>
   <p:notesSz cx="6858000" cy="9144000"/>
@@ -117,7 +120,18 @@
   </p:defaultTextStyle>
   <p:extLst>
     <p:ext uri="{EFAFB233-063F-42B5-8137-9DF3F51BA10A}">
-      <p15:sldGuideLst xmlns:p15="http://schemas.microsoft.com/office/powerpoint/2012/main" xmlns=""/>
+      <p15:sldGuideLst xmlns:p15="http://schemas.microsoft.com/office/powerpoint/2012/main">
+        <p15:guide id="1" orient="horz" pos="2160">
+          <p15:clr>
+            <a:srgbClr val="A4A3A4"/>
+          </p15:clr>
+        </p15:guide>
+        <p15:guide id="2" pos="3840">
+          <p15:clr>
+            <a:srgbClr val="A4A3A4"/>
+          </p15:clr>
+        </p15:guide>
+      </p15:sldGuideLst>
     </p:ext>
   </p:extLst>
 </p:presentation>
@@ -307,7 +321,7 @@
     </p:spTree>
     <p:extLst>
       <p:ext uri="{BB962C8B-B14F-4D97-AF65-F5344CB8AC3E}">
-        <p14:creationId xmlns:p14="http://schemas.microsoft.com/office/powerpoint/2010/main" xmlns="" val="3261322385"/>
+        <p14:creationId xmlns:p14="http://schemas.microsoft.com/office/powerpoint/2010/main" val="3261322385"/>
       </p:ext>
     </p:extLst>
   </p:cSld>
@@ -479,7 +493,7 @@
     </p:spTree>
     <p:extLst>
       <p:ext uri="{BB962C8B-B14F-4D97-AF65-F5344CB8AC3E}">
-        <p14:creationId xmlns:p14="http://schemas.microsoft.com/office/powerpoint/2010/main" xmlns="" val="1446185244"/>
+        <p14:creationId xmlns:p14="http://schemas.microsoft.com/office/powerpoint/2010/main" val="1446185244"/>
       </p:ext>
     </p:extLst>
   </p:cSld>
@@ -661,7 +675,7 @@
     </p:spTree>
     <p:extLst>
       <p:ext uri="{BB962C8B-B14F-4D97-AF65-F5344CB8AC3E}">
-        <p14:creationId xmlns:p14="http://schemas.microsoft.com/office/powerpoint/2010/main" xmlns="" val="3276760286"/>
+        <p14:creationId xmlns:p14="http://schemas.microsoft.com/office/powerpoint/2010/main" val="3276760286"/>
       </p:ext>
     </p:extLst>
   </p:cSld>
@@ -833,7 +847,7 @@
     </p:spTree>
     <p:extLst>
       <p:ext uri="{BB962C8B-B14F-4D97-AF65-F5344CB8AC3E}">
-        <p14:creationId xmlns:p14="http://schemas.microsoft.com/office/powerpoint/2010/main" xmlns="" val="2937646989"/>
+        <p14:creationId xmlns:p14="http://schemas.microsoft.com/office/powerpoint/2010/main" val="2937646989"/>
       </p:ext>
     </p:extLst>
   </p:cSld>
@@ -1081,7 +1095,7 @@
     </p:spTree>
     <p:extLst>
       <p:ext uri="{BB962C8B-B14F-4D97-AF65-F5344CB8AC3E}">
-        <p14:creationId xmlns:p14="http://schemas.microsoft.com/office/powerpoint/2010/main" xmlns="" val="3051430598"/>
+        <p14:creationId xmlns:p14="http://schemas.microsoft.com/office/powerpoint/2010/main" val="3051430598"/>
       </p:ext>
     </p:extLst>
   </p:cSld>
@@ -1315,7 +1329,7 @@
     </p:spTree>
     <p:extLst>
       <p:ext uri="{BB962C8B-B14F-4D97-AF65-F5344CB8AC3E}">
-        <p14:creationId xmlns:p14="http://schemas.microsoft.com/office/powerpoint/2010/main" xmlns="" val="3495486535"/>
+        <p14:creationId xmlns:p14="http://schemas.microsoft.com/office/powerpoint/2010/main" val="3495486535"/>
       </p:ext>
     </p:extLst>
   </p:cSld>
@@ -1684,7 +1698,7 @@
     </p:spTree>
     <p:extLst>
       <p:ext uri="{BB962C8B-B14F-4D97-AF65-F5344CB8AC3E}">
-        <p14:creationId xmlns:p14="http://schemas.microsoft.com/office/powerpoint/2010/main" xmlns="" val="758826873"/>
+        <p14:creationId xmlns:p14="http://schemas.microsoft.com/office/powerpoint/2010/main" val="758826873"/>
       </p:ext>
     </p:extLst>
   </p:cSld>
@@ -1804,7 +1818,7 @@
     </p:spTree>
     <p:extLst>
       <p:ext uri="{BB962C8B-B14F-4D97-AF65-F5344CB8AC3E}">
-        <p14:creationId xmlns:p14="http://schemas.microsoft.com/office/powerpoint/2010/main" xmlns="" val="1184858517"/>
+        <p14:creationId xmlns:p14="http://schemas.microsoft.com/office/powerpoint/2010/main" val="1184858517"/>
       </p:ext>
     </p:extLst>
   </p:cSld>
@@ -1901,7 +1915,7 @@
     </p:spTree>
     <p:extLst>
       <p:ext uri="{BB962C8B-B14F-4D97-AF65-F5344CB8AC3E}">
-        <p14:creationId xmlns:p14="http://schemas.microsoft.com/office/powerpoint/2010/main" xmlns="" val="3601995357"/>
+        <p14:creationId xmlns:p14="http://schemas.microsoft.com/office/powerpoint/2010/main" val="3601995357"/>
       </p:ext>
     </p:extLst>
   </p:cSld>
@@ -2180,7 +2194,7 @@
     </p:spTree>
     <p:extLst>
       <p:ext uri="{BB962C8B-B14F-4D97-AF65-F5344CB8AC3E}">
-        <p14:creationId xmlns:p14="http://schemas.microsoft.com/office/powerpoint/2010/main" xmlns="" val="1437381479"/>
+        <p14:creationId xmlns:p14="http://schemas.microsoft.com/office/powerpoint/2010/main" val="1437381479"/>
       </p:ext>
     </p:extLst>
   </p:cSld>
@@ -2435,7 +2449,7 @@
     </p:spTree>
     <p:extLst>
       <p:ext uri="{BB962C8B-B14F-4D97-AF65-F5344CB8AC3E}">
-        <p14:creationId xmlns:p14="http://schemas.microsoft.com/office/powerpoint/2010/main" xmlns="" val="1477953119"/>
+        <p14:creationId xmlns:p14="http://schemas.microsoft.com/office/powerpoint/2010/main" val="1477953119"/>
       </p:ext>
     </p:extLst>
   </p:cSld>
@@ -2686,7 +2700,7 @@
     </p:spTree>
     <p:extLst>
       <p:ext uri="{BB962C8B-B14F-4D97-AF65-F5344CB8AC3E}">
-        <p14:creationId xmlns:p14="http://schemas.microsoft.com/office/powerpoint/2010/main" xmlns="" val="404558158"/>
+        <p14:creationId xmlns:p14="http://schemas.microsoft.com/office/powerpoint/2010/main" val="404558158"/>
       </p:ext>
     </p:extLst>
   </p:cSld>
@@ -3148,7 +3162,7 @@
     </p:spTree>
     <p:extLst>
       <p:ext uri="{BB962C8B-B14F-4D97-AF65-F5344CB8AC3E}">
-        <p14:creationId xmlns:p14="http://schemas.microsoft.com/office/powerpoint/2010/main" xmlns="" val="895183294"/>
+        <p14:creationId xmlns:p14="http://schemas.microsoft.com/office/powerpoint/2010/main" val="895183294"/>
       </p:ext>
     </p:extLst>
   </p:cSld>
@@ -3238,7 +3252,7 @@
             <a:pPr algn="ctr"/>
             <a:r>
               <a:rPr lang="en-US" b="1" dirty="0" smtClean="0"/>
-              <a:t>Action Form (Controller)</a:t>
+              <a:t>User Registration Form (Controller)</a:t>
             </a:r>
             <a:endParaRPr lang="en-US" b="1" dirty="0"/>
           </a:p>
@@ -3259,7 +3273,7 @@
         </p:spPr>
         <p:txBody>
           <a:bodyPr>
-            <a:normAutofit lnSpcReduction="10000"/>
+            <a:normAutofit fontScale="85000" lnSpcReduction="20000"/>
           </a:bodyPr>
           <a:lstStyle/>
           <a:p>
@@ -3269,7 +3283,7 @@
             </a:r>
             <a:r>
               <a:rPr lang="en-US" dirty="0" err="1" smtClean="0"/>
-              <a:t>RequisitionInfo</a:t>
+              <a:t>UserInfo</a:t>
             </a:r>
             <a:endParaRPr lang="en-US" dirty="0"/>
           </a:p>
@@ -3294,16 +3308,91 @@
             </a:pPr>
             <a:r>
               <a:rPr lang="en-US" dirty="0"/>
+              <a:t>	Name;</a:t>
+            </a:r>
+          </a:p>
+          <a:p>
+            <a:pPr marL="0" indent="0">
+              <a:buNone/>
+            </a:pPr>
+            <a:r>
+              <a:rPr lang="en-US" dirty="0"/>
               <a:t>	</a:t>
             </a:r>
             <a:r>
               <a:rPr lang="en-US" dirty="0" err="1" smtClean="0"/>
-              <a:t>UserInfo</a:t>
+              <a:t>DesignationId</a:t>
             </a:r>
             <a:r>
               <a:rPr lang="en-US" dirty="0" smtClean="0"/>
               <a:t>;</a:t>
             </a:r>
+            <a:endParaRPr lang="en-US" dirty="0" smtClean="0"/>
+          </a:p>
+          <a:p>
+            <a:pPr marL="0" indent="0">
+              <a:buNone/>
+            </a:pPr>
+            <a:r>
+              <a:rPr lang="en-US" dirty="0"/>
+              <a:t>	</a:t>
+            </a:r>
+            <a:r>
+              <a:rPr lang="en-US" dirty="0" smtClean="0"/>
+              <a:t>Email;</a:t>
+            </a:r>
+            <a:endParaRPr lang="en-US" dirty="0"/>
+          </a:p>
+          <a:p>
+            <a:pPr marL="0" indent="0">
+              <a:buNone/>
+            </a:pPr>
+            <a:r>
+              <a:rPr lang="en-US" dirty="0"/>
+              <a:t>	</a:t>
+            </a:r>
+            <a:r>
+              <a:rPr lang="en-US" dirty="0" err="1"/>
+              <a:t>ContactNo</a:t>
+            </a:r>
+            <a:r>
+              <a:rPr lang="en-US" dirty="0" smtClean="0"/>
+              <a:t>;</a:t>
+            </a:r>
+            <a:endParaRPr lang="en-US" dirty="0"/>
+          </a:p>
+          <a:p>
+            <a:pPr marL="0" indent="0">
+              <a:buNone/>
+            </a:pPr>
+            <a:r>
+              <a:rPr lang="en-US" dirty="0"/>
+              <a:t>	Address;</a:t>
+            </a:r>
+          </a:p>
+          <a:p>
+            <a:r>
+              <a:rPr lang="en-US" dirty="0"/>
+              <a:t>Activity:</a:t>
+            </a:r>
+          </a:p>
+          <a:p>
+            <a:pPr marL="0" indent="0">
+              <a:buNone/>
+            </a:pPr>
+            <a:r>
+              <a:rPr lang="en-US" dirty="0"/>
+              <a:t>	</a:t>
+            </a:r>
+            <a:r>
+              <a:rPr lang="en-US" dirty="0" err="1" smtClean="0"/>
+              <a:t>CreateUser</a:t>
+            </a:r>
+            <a:r>
+              <a:rPr lang="en-US" dirty="0" smtClean="0"/>
+              <a:t>();</a:t>
+            </a:r>
+            <a:endParaRPr lang="en-US" dirty="0"/>
           </a:p>
           <a:p>
             <a:pPr marL="0" indent="0">
@@ -3315,80 +3404,13 @@
             </a:r>
             <a:r>
               <a:rPr lang="en-US" dirty="0" err="1" smtClean="0"/>
-              <a:t>RequisitionInfo</a:t>
+              <a:t>UserList</a:t>
             </a:r>
             <a:r>
               <a:rPr lang="en-US" dirty="0" smtClean="0"/>
-              <a:t>;</a:t>
-            </a:r>
-          </a:p>
-          <a:p>
-            <a:pPr marL="0" indent="0">
-              <a:buNone/>
-            </a:pPr>
-            <a:r>
-              <a:rPr lang="en-US" dirty="0" smtClean="0"/>
-              <a:t>	</a:t>
-            </a:r>
-            <a:r>
-              <a:rPr lang="en-US" dirty="0" err="1" smtClean="0"/>
-              <a:t>VehicleInfo</a:t>
-            </a:r>
-            <a:r>
-              <a:rPr lang="en-US" dirty="0" smtClean="0"/>
-              <a:t>;</a:t>
-            </a:r>
-          </a:p>
-          <a:p>
-            <a:pPr marL="0" indent="0">
-              <a:buNone/>
-            </a:pPr>
-            <a:r>
-              <a:rPr lang="en-US" dirty="0" smtClean="0"/>
-              <a:t>	</a:t>
-            </a:r>
-            <a:r>
-              <a:rPr lang="en-US" dirty="0" err="1" smtClean="0"/>
-              <a:t>DriverInfo</a:t>
-            </a:r>
-            <a:r>
-              <a:rPr lang="en-US" dirty="0" smtClean="0"/>
-              <a:t>;</a:t>
-            </a:r>
-          </a:p>
-          <a:p>
-            <a:pPr marL="0" indent="0">
-              <a:buNone/>
-            </a:pPr>
-            <a:r>
-              <a:rPr lang="en-US" dirty="0" smtClean="0"/>
-              <a:t>	</a:t>
-            </a:r>
-            <a:r>
-              <a:rPr lang="en-US" dirty="0" err="1" smtClean="0"/>
-              <a:t>CancelRequisition</a:t>
-            </a:r>
-            <a:r>
-              <a:rPr lang="en-US" dirty="0" smtClean="0"/>
-              <a:t>;</a:t>
-            </a:r>
-          </a:p>
-          <a:p>
-            <a:pPr marL="0" indent="0">
-              <a:buNone/>
-            </a:pPr>
-            <a:r>
-              <a:rPr lang="en-US" dirty="0"/>
-              <a:t>	</a:t>
-            </a:r>
-            <a:r>
-              <a:rPr lang="en-US" dirty="0" err="1" smtClean="0"/>
-              <a:t>ReassainRequisition</a:t>
-            </a:r>
-            <a:r>
-              <a:rPr lang="en-US" dirty="0" smtClean="0"/>
-              <a:t>;</a:t>
-            </a:r>
+              <a:t>();</a:t>
+            </a:r>
+            <a:endParaRPr lang="en-US" dirty="0" smtClean="0"/>
           </a:p>
           <a:p>
             <a:pPr marL="0" indent="0">
@@ -3401,143 +3423,207 @@
           </a:p>
         </p:txBody>
       </p:sp>
-      <p:sp>
-        <p:nvSpPr>
-          <p:cNvPr id="4" name="Content Placeholder 3"/>
-          <p:cNvSpPr>
-            <a:spLocks noGrp="1"/>
-          </p:cNvSpPr>
+      <p:graphicFrame>
+        <p:nvGraphicFramePr>
+          <p:cNvPr id="7" name="Content Placeholder 6"/>
+          <p:cNvGraphicFramePr>
+            <a:graphicFrameLocks noGrp="1"/>
+          </p:cNvGraphicFramePr>
           <p:nvPr>
             <p:ph sz="half" idx="2"/>
+            <p:extLst>
+              <p:ext uri="{D42A27DB-BD31-4B8C-83A1-F6EECF244321}">
+                <p14:modId xmlns:p14="http://schemas.microsoft.com/office/powerpoint/2010/main" val="4122830782"/>
+              </p:ext>
+            </p:extLst>
           </p:nvPr>
-        </p:nvSpPr>
-        <p:spPr/>
-        <p:txBody>
-          <a:bodyPr>
-            <a:normAutofit lnSpcReduction="10000"/>
-          </a:bodyPr>
-          <a:lstStyle/>
-          <a:p>
-            <a:endParaRPr lang="en-US" dirty="0" smtClean="0"/>
-          </a:p>
-          <a:p>
-            <a:r>
-              <a:rPr lang="en-US" dirty="0" smtClean="0"/>
-              <a:t>Activity</a:t>
-            </a:r>
-            <a:r>
-              <a:rPr lang="en-US" dirty="0"/>
-              <a:t>:</a:t>
-            </a:r>
-          </a:p>
-          <a:p>
-            <a:pPr marL="0" indent="0">
-              <a:buNone/>
-            </a:pPr>
-            <a:r>
-              <a:rPr lang="en-US" dirty="0"/>
-              <a:t>	</a:t>
-            </a:r>
-            <a:r>
-              <a:rPr lang="en-US" dirty="0" err="1"/>
-              <a:t>RequisitionList</a:t>
-            </a:r>
-            <a:r>
-              <a:rPr lang="en-US" dirty="0"/>
-              <a:t>();</a:t>
-            </a:r>
-          </a:p>
-          <a:p>
-            <a:pPr marL="0" indent="0">
-              <a:buNone/>
-            </a:pPr>
-            <a:r>
-              <a:rPr lang="en-US" dirty="0"/>
-              <a:t>	</a:t>
-            </a:r>
-            <a:r>
-              <a:rPr lang="en-US" dirty="0" err="1"/>
-              <a:t>SearchRequisition</a:t>
-            </a:r>
-            <a:r>
-              <a:rPr lang="en-US" dirty="0"/>
-              <a:t>();</a:t>
-            </a:r>
-          </a:p>
-          <a:p>
-            <a:pPr marL="0" indent="0">
-              <a:buNone/>
-            </a:pPr>
-            <a:r>
-              <a:rPr lang="en-US" dirty="0"/>
-              <a:t>	</a:t>
-            </a:r>
-            <a:r>
-              <a:rPr lang="en-US" dirty="0" err="1"/>
-              <a:t>ApproveRequisition</a:t>
-            </a:r>
-            <a:r>
-              <a:rPr lang="en-US" dirty="0"/>
-              <a:t>();</a:t>
-            </a:r>
-          </a:p>
-          <a:p>
-            <a:pPr marL="0" indent="0">
-              <a:buNone/>
-            </a:pPr>
-            <a:r>
-              <a:rPr lang="en-US" dirty="0"/>
-              <a:t>	</a:t>
-            </a:r>
-            <a:r>
-              <a:rPr lang="en-US" dirty="0" err="1"/>
-              <a:t>CancelRequisition</a:t>
-            </a:r>
-            <a:r>
-              <a:rPr lang="en-US" dirty="0"/>
-              <a:t>();</a:t>
-            </a:r>
-          </a:p>
-          <a:p>
-            <a:pPr marL="0" indent="0">
-              <a:buNone/>
-            </a:pPr>
-            <a:r>
-              <a:rPr lang="en-US" dirty="0"/>
-              <a:t>	</a:t>
-            </a:r>
-            <a:r>
-              <a:rPr lang="en-US" dirty="0" err="1"/>
-              <a:t>CheckInTime</a:t>
-            </a:r>
-            <a:r>
-              <a:rPr lang="en-US" dirty="0"/>
-              <a:t>();</a:t>
-            </a:r>
-          </a:p>
-          <a:p>
-            <a:pPr marL="0" indent="0">
-              <a:buNone/>
-            </a:pPr>
-            <a:r>
-              <a:rPr lang="en-US" dirty="0"/>
-              <a:t>	</a:t>
-            </a:r>
-            <a:r>
-              <a:rPr lang="en-US" dirty="0" err="1"/>
-              <a:t>CheckOutTime</a:t>
-            </a:r>
-            <a:r>
-              <a:rPr lang="en-US" dirty="0"/>
-              <a:t>();</a:t>
-            </a:r>
-          </a:p>
-        </p:txBody>
-      </p:sp>
+        </p:nvGraphicFramePr>
+        <p:xfrm>
+          <a:off x="6172200" y="1825625"/>
+          <a:ext cx="5181600" cy="4054668"/>
+        </p:xfrm>
+        <a:graphic>
+          <a:graphicData uri="http://schemas.openxmlformats.org/drawingml/2006/table">
+            <a:tbl>
+              <a:tblPr firstRow="1" bandRow="1">
+                <a:tableStyleId>{5C22544A-7EE6-4342-B048-85BDC9FD1C3A}</a:tableStyleId>
+              </a:tblPr>
+              <a:tblGrid>
+                <a:gridCol w="2590800"/>
+                <a:gridCol w="2590800"/>
+              </a:tblGrid>
+              <a:tr h="675778">
+                <a:tc>
+                  <a:txBody>
+                    <a:bodyPr/>
+                    <a:lstStyle/>
+                    <a:p>
+                      <a:r>
+                        <a:rPr lang="en-US" dirty="0" smtClean="0"/>
+                        <a:t>Title</a:t>
+                      </a:r>
+                      <a:endParaRPr lang="en-US" dirty="0"/>
+                    </a:p>
+                  </a:txBody>
+                  <a:tcPr/>
+                </a:tc>
+                <a:tc>
+                  <a:txBody>
+                    <a:bodyPr/>
+                    <a:lstStyle/>
+                    <a:p>
+                      <a:r>
+                        <a:rPr lang="en-US" dirty="0" smtClean="0"/>
+                        <a:t>Text Box		</a:t>
+                      </a:r>
+                      <a:endParaRPr lang="en-US" dirty="0"/>
+                    </a:p>
+                  </a:txBody>
+                  <a:tcPr/>
+                </a:tc>
+              </a:tr>
+              <a:tr h="675778">
+                <a:tc>
+                  <a:txBody>
+                    <a:bodyPr/>
+                    <a:lstStyle/>
+                    <a:p>
+                      <a:r>
+                        <a:rPr lang="en-US" dirty="0" smtClean="0"/>
+                        <a:t>Name</a:t>
+                      </a:r>
+                      <a:endParaRPr lang="en-US" dirty="0"/>
+                    </a:p>
+                  </a:txBody>
+                  <a:tcPr/>
+                </a:tc>
+                <a:tc>
+                  <a:txBody>
+                    <a:bodyPr/>
+                    <a:lstStyle/>
+                    <a:p>
+                      <a:endParaRPr lang="en-US" dirty="0"/>
+                    </a:p>
+                  </a:txBody>
+                  <a:tcPr/>
+                </a:tc>
+              </a:tr>
+              <a:tr h="675778">
+                <a:tc>
+                  <a:txBody>
+                    <a:bodyPr/>
+                    <a:lstStyle/>
+                    <a:p>
+                      <a:r>
+                        <a:rPr lang="en-US" dirty="0" smtClean="0"/>
+                        <a:t>Designation</a:t>
+                      </a:r>
+                      <a:endParaRPr lang="en-US" dirty="0"/>
+                    </a:p>
+                  </a:txBody>
+                  <a:tcPr/>
+                </a:tc>
+                <a:tc>
+                  <a:txBody>
+                    <a:bodyPr/>
+                    <a:lstStyle/>
+                    <a:p>
+                      <a:endParaRPr lang="en-US" dirty="0"/>
+                    </a:p>
+                  </a:txBody>
+                  <a:tcPr/>
+                </a:tc>
+              </a:tr>
+              <a:tr h="675778">
+                <a:tc>
+                  <a:txBody>
+                    <a:bodyPr/>
+                    <a:lstStyle/>
+                    <a:p>
+                      <a:r>
+                        <a:rPr lang="en-US" dirty="0" smtClean="0"/>
+                        <a:t>Email</a:t>
+                      </a:r>
+                      <a:endParaRPr lang="en-US" dirty="0"/>
+                    </a:p>
+                  </a:txBody>
+                  <a:tcPr/>
+                </a:tc>
+                <a:tc>
+                  <a:txBody>
+                    <a:bodyPr/>
+                    <a:lstStyle/>
+                    <a:p>
+                      <a:endParaRPr lang="en-US" dirty="0"/>
+                    </a:p>
+                  </a:txBody>
+                  <a:tcPr/>
+                </a:tc>
+              </a:tr>
+              <a:tr h="675778">
+                <a:tc>
+                  <a:txBody>
+                    <a:bodyPr/>
+                    <a:lstStyle/>
+                    <a:p>
+                      <a:r>
+                        <a:rPr lang="en-US" dirty="0" smtClean="0"/>
+                        <a:t>Mobile </a:t>
+                      </a:r>
+                      <a:r>
+                        <a:rPr lang="en-US" dirty="0" smtClean="0"/>
+                        <a:t>No</a:t>
+                      </a:r>
+                      <a:endParaRPr lang="en-US" dirty="0"/>
+                    </a:p>
+                  </a:txBody>
+                  <a:tcPr/>
+                </a:tc>
+                <a:tc>
+                  <a:txBody>
+                    <a:bodyPr/>
+                    <a:lstStyle/>
+                    <a:p>
+                      <a:endParaRPr lang="en-US" dirty="0"/>
+                    </a:p>
+                  </a:txBody>
+                  <a:tcPr/>
+                </a:tc>
+              </a:tr>
+              <a:tr h="675778">
+                <a:tc>
+                  <a:txBody>
+                    <a:bodyPr/>
+                    <a:lstStyle/>
+                    <a:p>
+                      <a:r>
+                        <a:rPr lang="en-US" dirty="0" smtClean="0"/>
+                        <a:t>Office Address</a:t>
+                      </a:r>
+                      <a:endParaRPr lang="en-US" dirty="0"/>
+                    </a:p>
+                  </a:txBody>
+                  <a:tcPr/>
+                </a:tc>
+                <a:tc>
+                  <a:txBody>
+                    <a:bodyPr/>
+                    <a:lstStyle/>
+                    <a:p>
+                      <a:endParaRPr lang="en-US" dirty="0"/>
+                    </a:p>
+                  </a:txBody>
+                  <a:tcPr/>
+                </a:tc>
+              </a:tr>
+            </a:tbl>
+          </a:graphicData>
+        </a:graphic>
+      </p:graphicFrame>
     </p:spTree>
     <p:extLst>
       <p:ext uri="{BB962C8B-B14F-4D97-AF65-F5344CB8AC3E}">
-        <p14:creationId xmlns:p14="http://schemas.microsoft.com/office/powerpoint/2010/main" xmlns="" val="3827304921"/>
+        <p14:creationId xmlns:p14="http://schemas.microsoft.com/office/powerpoint/2010/main" val="2198716805"/>
       </p:ext>
     </p:extLst>
   </p:cSld>
@@ -3627,6 +3713,395 @@
             <a:pPr algn="ctr"/>
             <a:r>
               <a:rPr lang="en-US" b="1" dirty="0" smtClean="0"/>
+              <a:t>Action Form (Controller)</a:t>
+            </a:r>
+            <a:endParaRPr lang="en-US" b="1" dirty="0"/>
+          </a:p>
+        </p:txBody>
+      </p:sp>
+      <p:sp>
+        <p:nvSpPr>
+          <p:cNvPr id="3" name="Content Placeholder 2"/>
+          <p:cNvSpPr>
+            <a:spLocks noGrp="1"/>
+          </p:cNvSpPr>
+          <p:nvPr>
+            <p:ph sz="half" idx="1"/>
+          </p:nvPr>
+        </p:nvSpPr>
+        <p:spPr>
+          <a:noFill/>
+        </p:spPr>
+        <p:txBody>
+          <a:bodyPr>
+            <a:normAutofit lnSpcReduction="10000"/>
+          </a:bodyPr>
+          <a:lstStyle/>
+          <a:p>
+            <a:r>
+              <a:rPr lang="en-US" dirty="0"/>
+              <a:t>Object: </a:t>
+            </a:r>
+            <a:r>
+              <a:rPr lang="en-US" dirty="0" err="1" smtClean="0"/>
+              <a:t>RequisitionInfo</a:t>
+            </a:r>
+            <a:endParaRPr lang="en-US" dirty="0"/>
+          </a:p>
+          <a:p>
+            <a:r>
+              <a:rPr lang="en-US" dirty="0" smtClean="0"/>
+              <a:t>Attribute</a:t>
+            </a:r>
+          </a:p>
+          <a:p>
+            <a:pPr marL="457200" lvl="1" indent="0">
+              <a:buNone/>
+            </a:pPr>
+            <a:r>
+              <a:rPr lang="en-US" dirty="0" smtClean="0"/>
+              <a:t>	Id;</a:t>
+            </a:r>
+          </a:p>
+          <a:p>
+            <a:pPr marL="0" indent="0">
+              <a:buNone/>
+            </a:pPr>
+            <a:r>
+              <a:rPr lang="en-US" dirty="0"/>
+              <a:t>	</a:t>
+            </a:r>
+            <a:r>
+              <a:rPr lang="en-US" dirty="0" err="1" smtClean="0"/>
+              <a:t>UserInfo</a:t>
+            </a:r>
+            <a:r>
+              <a:rPr lang="en-US" dirty="0" smtClean="0"/>
+              <a:t>;</a:t>
+            </a:r>
+          </a:p>
+          <a:p>
+            <a:pPr marL="0" indent="0">
+              <a:buNone/>
+            </a:pPr>
+            <a:r>
+              <a:rPr lang="en-US" dirty="0" smtClean="0"/>
+              <a:t>	</a:t>
+            </a:r>
+            <a:r>
+              <a:rPr lang="en-US" dirty="0" err="1" smtClean="0"/>
+              <a:t>RequisitionInfo</a:t>
+            </a:r>
+            <a:r>
+              <a:rPr lang="en-US" dirty="0" smtClean="0"/>
+              <a:t>;</a:t>
+            </a:r>
+          </a:p>
+          <a:p>
+            <a:pPr marL="0" indent="0">
+              <a:buNone/>
+            </a:pPr>
+            <a:r>
+              <a:rPr lang="en-US" dirty="0" smtClean="0"/>
+              <a:t>	</a:t>
+            </a:r>
+            <a:r>
+              <a:rPr lang="en-US" dirty="0" err="1" smtClean="0"/>
+              <a:t>VehicleInfo</a:t>
+            </a:r>
+            <a:r>
+              <a:rPr lang="en-US" dirty="0" smtClean="0"/>
+              <a:t>;</a:t>
+            </a:r>
+          </a:p>
+          <a:p>
+            <a:pPr marL="0" indent="0">
+              <a:buNone/>
+            </a:pPr>
+            <a:r>
+              <a:rPr lang="en-US" dirty="0" smtClean="0"/>
+              <a:t>	</a:t>
+            </a:r>
+            <a:r>
+              <a:rPr lang="en-US" dirty="0" err="1" smtClean="0"/>
+              <a:t>DriverInfo</a:t>
+            </a:r>
+            <a:r>
+              <a:rPr lang="en-US" dirty="0" smtClean="0"/>
+              <a:t>;</a:t>
+            </a:r>
+          </a:p>
+          <a:p>
+            <a:pPr marL="0" indent="0">
+              <a:buNone/>
+            </a:pPr>
+            <a:r>
+              <a:rPr lang="en-US" dirty="0" smtClean="0"/>
+              <a:t>	</a:t>
+            </a:r>
+            <a:r>
+              <a:rPr lang="en-US" dirty="0" err="1" smtClean="0"/>
+              <a:t>CancelRequisition</a:t>
+            </a:r>
+            <a:r>
+              <a:rPr lang="en-US" dirty="0" smtClean="0"/>
+              <a:t>;</a:t>
+            </a:r>
+          </a:p>
+          <a:p>
+            <a:pPr marL="0" indent="0">
+              <a:buNone/>
+            </a:pPr>
+            <a:r>
+              <a:rPr lang="en-US" dirty="0"/>
+              <a:t>	</a:t>
+            </a:r>
+            <a:r>
+              <a:rPr lang="en-US" dirty="0" err="1" smtClean="0"/>
+              <a:t>ReassainRequisition</a:t>
+            </a:r>
+            <a:r>
+              <a:rPr lang="en-US" dirty="0" smtClean="0"/>
+              <a:t>;</a:t>
+            </a:r>
+          </a:p>
+          <a:p>
+            <a:pPr marL="0" indent="0">
+              <a:buNone/>
+            </a:pPr>
+            <a:endParaRPr lang="en-US" dirty="0"/>
+          </a:p>
+          <a:p>
+            <a:endParaRPr lang="en-US" dirty="0"/>
+          </a:p>
+        </p:txBody>
+      </p:sp>
+      <p:sp>
+        <p:nvSpPr>
+          <p:cNvPr id="4" name="Content Placeholder 3"/>
+          <p:cNvSpPr>
+            <a:spLocks noGrp="1"/>
+          </p:cNvSpPr>
+          <p:nvPr>
+            <p:ph sz="half" idx="2"/>
+          </p:nvPr>
+        </p:nvSpPr>
+        <p:spPr/>
+        <p:txBody>
+          <a:bodyPr>
+            <a:normAutofit lnSpcReduction="10000"/>
+          </a:bodyPr>
+          <a:lstStyle/>
+          <a:p>
+            <a:endParaRPr lang="en-US" dirty="0" smtClean="0"/>
+          </a:p>
+          <a:p>
+            <a:r>
+              <a:rPr lang="en-US" dirty="0" smtClean="0"/>
+              <a:t>Activity</a:t>
+            </a:r>
+            <a:r>
+              <a:rPr lang="en-US" dirty="0"/>
+              <a:t>:</a:t>
+            </a:r>
+          </a:p>
+          <a:p>
+            <a:pPr marL="0" indent="0">
+              <a:buNone/>
+            </a:pPr>
+            <a:r>
+              <a:rPr lang="en-US" dirty="0"/>
+              <a:t>	</a:t>
+            </a:r>
+            <a:r>
+              <a:rPr lang="en-US" dirty="0" err="1"/>
+              <a:t>RequisitionList</a:t>
+            </a:r>
+            <a:r>
+              <a:rPr lang="en-US" dirty="0"/>
+              <a:t>();</a:t>
+            </a:r>
+          </a:p>
+          <a:p>
+            <a:pPr marL="0" indent="0">
+              <a:buNone/>
+            </a:pPr>
+            <a:r>
+              <a:rPr lang="en-US" dirty="0"/>
+              <a:t>	</a:t>
+            </a:r>
+            <a:r>
+              <a:rPr lang="en-US" dirty="0" err="1"/>
+              <a:t>SearchRequisition</a:t>
+            </a:r>
+            <a:r>
+              <a:rPr lang="en-US" dirty="0"/>
+              <a:t>();</a:t>
+            </a:r>
+          </a:p>
+          <a:p>
+            <a:pPr marL="0" indent="0">
+              <a:buNone/>
+            </a:pPr>
+            <a:r>
+              <a:rPr lang="en-US" dirty="0"/>
+              <a:t>	</a:t>
+            </a:r>
+            <a:r>
+              <a:rPr lang="en-US" dirty="0" err="1"/>
+              <a:t>ApproveRequisition</a:t>
+            </a:r>
+            <a:r>
+              <a:rPr lang="en-US" dirty="0"/>
+              <a:t>();</a:t>
+            </a:r>
+          </a:p>
+          <a:p>
+            <a:pPr marL="0" indent="0">
+              <a:buNone/>
+            </a:pPr>
+            <a:r>
+              <a:rPr lang="en-US" dirty="0"/>
+              <a:t>	</a:t>
+            </a:r>
+            <a:r>
+              <a:rPr lang="en-US" dirty="0" err="1"/>
+              <a:t>CancelRequisition</a:t>
+            </a:r>
+            <a:r>
+              <a:rPr lang="en-US" dirty="0"/>
+              <a:t>();</a:t>
+            </a:r>
+          </a:p>
+          <a:p>
+            <a:pPr marL="0" indent="0">
+              <a:buNone/>
+            </a:pPr>
+            <a:r>
+              <a:rPr lang="en-US" dirty="0"/>
+              <a:t>	</a:t>
+            </a:r>
+            <a:r>
+              <a:rPr lang="en-US" dirty="0" err="1"/>
+              <a:t>CheckInTime</a:t>
+            </a:r>
+            <a:r>
+              <a:rPr lang="en-US" dirty="0"/>
+              <a:t>();</a:t>
+            </a:r>
+          </a:p>
+          <a:p>
+            <a:pPr marL="0" indent="0">
+              <a:buNone/>
+            </a:pPr>
+            <a:r>
+              <a:rPr lang="en-US" dirty="0"/>
+              <a:t>	</a:t>
+            </a:r>
+            <a:r>
+              <a:rPr lang="en-US" dirty="0" err="1"/>
+              <a:t>CheckOutTime</a:t>
+            </a:r>
+            <a:r>
+              <a:rPr lang="en-US" dirty="0"/>
+              <a:t>();</a:t>
+            </a:r>
+          </a:p>
+        </p:txBody>
+      </p:sp>
+    </p:spTree>
+    <p:extLst>
+      <p:ext uri="{BB962C8B-B14F-4D97-AF65-F5344CB8AC3E}">
+        <p14:creationId xmlns:p14="http://schemas.microsoft.com/office/powerpoint/2010/main" val="3827304921"/>
+      </p:ext>
+    </p:extLst>
+  </p:cSld>
+  <p:clrMapOvr>
+    <a:masterClrMapping/>
+  </p:clrMapOvr>
+  <p:timing>
+    <p:tnLst>
+      <p:par>
+        <p:cTn id="1" dur="indefinite" restart="never" nodeType="tmRoot"/>
+      </p:par>
+    </p:tnLst>
+  </p:timing>
+</p:sld>
+</file>
+
+<file path=ppt/slides/slide12.xml><?xml version="1.0" encoding="utf-8"?>
+<p:sld xmlns:a="http://schemas.openxmlformats.org/drawingml/2006/main" xmlns:r="http://schemas.openxmlformats.org/officeDocument/2006/relationships" xmlns:p="http://schemas.openxmlformats.org/presentationml/2006/main">
+  <p:cSld>
+    <p:bg>
+      <p:bgPr>
+        <a:solidFill>
+          <a:schemeClr val="accent4">
+            <a:lumMod val="75000"/>
+          </a:schemeClr>
+        </a:solidFill>
+        <a:effectLst/>
+      </p:bgPr>
+    </p:bg>
+    <p:spTree>
+      <p:nvGrpSpPr>
+        <p:cNvPr id="1" name=""/>
+        <p:cNvGrpSpPr/>
+        <p:nvPr/>
+      </p:nvGrpSpPr>
+      <p:grpSpPr>
+        <a:xfrm>
+          <a:off x="0" y="0"/>
+          <a:ext cx="0" cy="0"/>
+          <a:chOff x="0" y="0"/>
+          <a:chExt cx="0" cy="0"/>
+        </a:xfrm>
+      </p:grpSpPr>
+      <p:sp>
+        <p:nvSpPr>
+          <p:cNvPr id="2" name="Title 1"/>
+          <p:cNvSpPr>
+            <a:spLocks noGrp="1"/>
+          </p:cNvSpPr>
+          <p:nvPr>
+            <p:ph type="title"/>
+          </p:nvPr>
+        </p:nvSpPr>
+        <p:spPr>
+          <a:gradFill>
+            <a:gsLst>
+              <a:gs pos="0">
+                <a:schemeClr val="accent4">
+                  <a:lumMod val="89000"/>
+                </a:schemeClr>
+              </a:gs>
+              <a:gs pos="23000">
+                <a:schemeClr val="accent4">
+                  <a:lumMod val="89000"/>
+                </a:schemeClr>
+              </a:gs>
+              <a:gs pos="69000">
+                <a:schemeClr val="accent4">
+                  <a:lumMod val="75000"/>
+                </a:schemeClr>
+              </a:gs>
+              <a:gs pos="97000">
+                <a:schemeClr val="accent4">
+                  <a:lumMod val="70000"/>
+                </a:schemeClr>
+              </a:gs>
+            </a:gsLst>
+            <a:path path="circle">
+              <a:fillToRect l="50000" t="50000" r="50000" b="50000"/>
+            </a:path>
+          </a:gradFill>
+        </p:spPr>
+        <p:txBody>
+          <a:bodyPr/>
+          <a:lstStyle/>
+          <a:p>
+            <a:pPr algn="ctr"/>
+            <a:r>
+              <a:rPr lang="en-US" b="1" dirty="0" smtClean="0"/>
               <a:t>Requisition Form (User)</a:t>
             </a:r>
             <a:endParaRPr lang="en-US" b="1" dirty="0"/>
@@ -3859,7 +4334,7 @@
             <p:ph sz="half" idx="2"/>
             <p:extLst>
               <p:ext uri="{D42A27DB-BD31-4B8C-83A1-F6EECF244321}">
-                <p14:modId xmlns:p14="http://schemas.microsoft.com/office/powerpoint/2010/main" xmlns="" val="1426166606"/>
+                <p14:modId xmlns:p14="http://schemas.microsoft.com/office/powerpoint/2010/main" val="1426166606"/>
               </p:ext>
             </p:extLst>
           </p:nvPr>
@@ -4482,7 +4957,7 @@
     </p:spTree>
     <p:extLst>
       <p:ext uri="{BB962C8B-B14F-4D97-AF65-F5344CB8AC3E}">
-        <p14:creationId xmlns:p14="http://schemas.microsoft.com/office/powerpoint/2010/main" xmlns="" val="1522459881"/>
+        <p14:creationId xmlns:p14="http://schemas.microsoft.com/office/powerpoint/2010/main" val="1522459881"/>
       </p:ext>
     </p:extLst>
   </p:cSld>
@@ -4499,7 +4974,1240 @@
 </p:sld>
 </file>
 
-<file path=ppt/slides/slide12.xml><?xml version="1.0" encoding="utf-8"?>
+<file path=ppt/slides/slide13.xml><?xml version="1.0" encoding="utf-8"?>
+<p:sld xmlns:a="http://schemas.openxmlformats.org/drawingml/2006/main" xmlns:r="http://schemas.openxmlformats.org/officeDocument/2006/relationships" xmlns:p="http://schemas.openxmlformats.org/presentationml/2006/main">
+  <p:cSld>
+    <p:bg>
+      <p:bgPr>
+        <a:solidFill>
+          <a:schemeClr val="accent4">
+            <a:lumMod val="75000"/>
+          </a:schemeClr>
+        </a:solidFill>
+        <a:effectLst/>
+      </p:bgPr>
+    </p:bg>
+    <p:spTree>
+      <p:nvGrpSpPr>
+        <p:cNvPr id="1" name=""/>
+        <p:cNvGrpSpPr/>
+        <p:nvPr/>
+      </p:nvGrpSpPr>
+      <p:grpSpPr>
+        <a:xfrm>
+          <a:off x="0" y="0"/>
+          <a:ext cx="0" cy="0"/>
+          <a:chOff x="0" y="0"/>
+          <a:chExt cx="0" cy="0"/>
+        </a:xfrm>
+      </p:grpSpPr>
+      <p:sp>
+        <p:nvSpPr>
+          <p:cNvPr id="2" name="Title 1"/>
+          <p:cNvSpPr>
+            <a:spLocks noGrp="1"/>
+          </p:cNvSpPr>
+          <p:nvPr>
+            <p:ph type="title"/>
+          </p:nvPr>
+        </p:nvSpPr>
+        <p:spPr>
+          <a:gradFill>
+            <a:gsLst>
+              <a:gs pos="0">
+                <a:schemeClr val="accent4">
+                  <a:lumMod val="89000"/>
+                </a:schemeClr>
+              </a:gs>
+              <a:gs pos="23000">
+                <a:schemeClr val="accent4">
+                  <a:lumMod val="89000"/>
+                </a:schemeClr>
+              </a:gs>
+              <a:gs pos="69000">
+                <a:schemeClr val="accent4">
+                  <a:lumMod val="75000"/>
+                </a:schemeClr>
+              </a:gs>
+              <a:gs pos="97000">
+                <a:schemeClr val="accent4">
+                  <a:lumMod val="70000"/>
+                </a:schemeClr>
+              </a:gs>
+            </a:gsLst>
+            <a:path path="circle">
+              <a:fillToRect l="50000" t="50000" r="50000" b="50000"/>
+            </a:path>
+          </a:gradFill>
+        </p:spPr>
+        <p:txBody>
+          <a:bodyPr/>
+          <a:lstStyle/>
+          <a:p>
+            <a:pPr algn="ctr"/>
+            <a:r>
+              <a:rPr lang="en-US" b="1" dirty="0" smtClean="0"/>
+              <a:t>User Diagram</a:t>
+            </a:r>
+            <a:endParaRPr lang="en-US" b="1" dirty="0"/>
+          </a:p>
+        </p:txBody>
+      </p:sp>
+      <p:graphicFrame>
+        <p:nvGraphicFramePr>
+          <p:cNvPr id="11" name="Content Placeholder 10"/>
+          <p:cNvGraphicFramePr>
+            <a:graphicFrameLocks noGrp="1"/>
+          </p:cNvGraphicFramePr>
+          <p:nvPr>
+            <p:ph sz="half" idx="1"/>
+            <p:extLst>
+              <p:ext uri="{D42A27DB-BD31-4B8C-83A1-F6EECF244321}">
+                <p14:modId xmlns:p14="http://schemas.microsoft.com/office/powerpoint/2010/main" val="3869647136"/>
+              </p:ext>
+            </p:extLst>
+          </p:nvPr>
+        </p:nvGraphicFramePr>
+        <p:xfrm>
+          <a:off x="838200" y="1825625"/>
+          <a:ext cx="10515604" cy="1545372"/>
+        </p:xfrm>
+        <a:graphic>
+          <a:graphicData uri="http://schemas.openxmlformats.org/drawingml/2006/table">
+            <a:tbl>
+              <a:tblPr firstRow="1" bandRow="1">
+                <a:tableStyleId>{5C22544A-7EE6-4342-B048-85BDC9FD1C3A}</a:tableStyleId>
+              </a:tblPr>
+              <a:tblGrid>
+                <a:gridCol w="1502229"/>
+                <a:gridCol w="1502230"/>
+                <a:gridCol w="1357138"/>
+                <a:gridCol w="896205"/>
+                <a:gridCol w="751115"/>
+                <a:gridCol w="1502229"/>
+                <a:gridCol w="1502229"/>
+                <a:gridCol w="1502229"/>
+              </a:tblGrid>
+              <a:tr h="515124">
+                <a:tc gridSpan="8">
+                  <a:txBody>
+                    <a:bodyPr/>
+                    <a:lstStyle/>
+                    <a:p>
+                      <a:pPr algn="ctr"/>
+                      <a:r>
+                        <a:rPr lang="en-US" dirty="0" smtClean="0"/>
+                        <a:t>Login</a:t>
+                      </a:r>
+                      <a:endParaRPr lang="en-US" dirty="0"/>
+                    </a:p>
+                  </a:txBody>
+                  <a:tcPr/>
+                </a:tc>
+                <a:tc hMerge="1">
+                  <a:txBody>
+                    <a:bodyPr/>
+                    <a:lstStyle/>
+                    <a:p>
+                      <a:endParaRPr lang="en-US"/>
+                    </a:p>
+                  </a:txBody>
+                  <a:tcPr/>
+                </a:tc>
+                <a:tc hMerge="1">
+                  <a:txBody>
+                    <a:bodyPr/>
+                    <a:lstStyle/>
+                    <a:p>
+                      <a:endParaRPr lang="en-US"/>
+                    </a:p>
+                  </a:txBody>
+                  <a:tcPr/>
+                </a:tc>
+                <a:tc hMerge="1">
+                  <a:txBody>
+                    <a:bodyPr/>
+                    <a:lstStyle/>
+                    <a:p>
+                      <a:endParaRPr lang="en-US"/>
+                    </a:p>
+                  </a:txBody>
+                  <a:tcPr/>
+                </a:tc>
+                <a:tc hMerge="1">
+                  <a:txBody>
+                    <a:bodyPr/>
+                    <a:lstStyle/>
+                    <a:p>
+                      <a:endParaRPr lang="en-US"/>
+                    </a:p>
+                  </a:txBody>
+                  <a:tcPr/>
+                </a:tc>
+                <a:tc hMerge="1">
+                  <a:txBody>
+                    <a:bodyPr/>
+                    <a:lstStyle/>
+                    <a:p>
+                      <a:endParaRPr lang="en-US"/>
+                    </a:p>
+                  </a:txBody>
+                  <a:tcPr/>
+                </a:tc>
+                <a:tc hMerge="1">
+                  <a:txBody>
+                    <a:bodyPr/>
+                    <a:lstStyle/>
+                    <a:p>
+                      <a:endParaRPr lang="en-US"/>
+                    </a:p>
+                  </a:txBody>
+                  <a:tcPr/>
+                </a:tc>
+                <a:tc hMerge="1">
+                  <a:txBody>
+                    <a:bodyPr/>
+                    <a:lstStyle/>
+                    <a:p>
+                      <a:pPr algn="ctr"/>
+                      <a:endParaRPr lang="en-US" dirty="0"/>
+                    </a:p>
+                  </a:txBody>
+                  <a:tcPr/>
+                </a:tc>
+              </a:tr>
+              <a:tr h="515124">
+                <a:tc gridSpan="4">
+                  <a:txBody>
+                    <a:bodyPr/>
+                    <a:lstStyle/>
+                    <a:p>
+                      <a:pPr algn="r"/>
+                      <a:r>
+                        <a:rPr lang="en-US" dirty="0" smtClean="0"/>
+                        <a:t>Search Box:</a:t>
+                      </a:r>
+                      <a:endParaRPr lang="en-US" dirty="0"/>
+                    </a:p>
+                  </a:txBody>
+                  <a:tcPr>
+                    <a:solidFill>
+                      <a:schemeClr val="tx2"/>
+                    </a:solidFill>
+                  </a:tcPr>
+                </a:tc>
+                <a:tc hMerge="1">
+                  <a:txBody>
+                    <a:bodyPr/>
+                    <a:lstStyle/>
+                    <a:p>
+                      <a:endParaRPr lang="en-US"/>
+                    </a:p>
+                  </a:txBody>
+                  <a:tcPr/>
+                </a:tc>
+                <a:tc hMerge="1">
+                  <a:txBody>
+                    <a:bodyPr/>
+                    <a:lstStyle/>
+                    <a:p>
+                      <a:endParaRPr lang="en-US"/>
+                    </a:p>
+                  </a:txBody>
+                  <a:tcPr/>
+                </a:tc>
+                <a:tc hMerge="1">
+                  <a:txBody>
+                    <a:bodyPr/>
+                    <a:lstStyle/>
+                    <a:p>
+                      <a:pPr algn="l"/>
+                      <a:endParaRPr lang="en-US" dirty="0"/>
+                    </a:p>
+                  </a:txBody>
+                  <a:tcPr/>
+                </a:tc>
+                <a:tc gridSpan="4">
+                  <a:txBody>
+                    <a:bodyPr/>
+                    <a:lstStyle/>
+                    <a:p>
+                      <a:pPr algn="r"/>
+                      <a:endParaRPr lang="en-US" dirty="0"/>
+                    </a:p>
+                  </a:txBody>
+                  <a:tcPr>
+                    <a:solidFill>
+                      <a:schemeClr val="tx2"/>
+                    </a:solidFill>
+                  </a:tcPr>
+                </a:tc>
+                <a:tc hMerge="1">
+                  <a:txBody>
+                    <a:bodyPr/>
+                    <a:lstStyle/>
+                    <a:p>
+                      <a:endParaRPr lang="en-US"/>
+                    </a:p>
+                  </a:txBody>
+                  <a:tcPr/>
+                </a:tc>
+                <a:tc hMerge="1">
+                  <a:txBody>
+                    <a:bodyPr/>
+                    <a:lstStyle/>
+                    <a:p>
+                      <a:pPr algn="l"/>
+                      <a:endParaRPr lang="en-US" dirty="0"/>
+                    </a:p>
+                  </a:txBody>
+                  <a:tcPr/>
+                </a:tc>
+                <a:tc hMerge="1">
+                  <a:txBody>
+                    <a:bodyPr/>
+                    <a:lstStyle/>
+                    <a:p>
+                      <a:pPr algn="l"/>
+                      <a:endParaRPr lang="en-US" dirty="0"/>
+                    </a:p>
+                  </a:txBody>
+                  <a:tcPr/>
+                </a:tc>
+              </a:tr>
+              <a:tr h="515124">
+                <a:tc>
+                  <a:txBody>
+                    <a:bodyPr/>
+                    <a:lstStyle/>
+                    <a:p>
+                      <a:pPr algn="l"/>
+                      <a:r>
+                        <a:rPr lang="en-US" dirty="0" smtClean="0"/>
+                        <a:t>Home</a:t>
+                      </a:r>
+                      <a:endParaRPr lang="en-US" dirty="0"/>
+                    </a:p>
+                  </a:txBody>
+                  <a:tcPr/>
+                </a:tc>
+                <a:tc>
+                  <a:txBody>
+                    <a:bodyPr/>
+                    <a:lstStyle/>
+                    <a:p>
+                      <a:pPr algn="l"/>
+                      <a:r>
+                        <a:rPr lang="en-US" dirty="0" smtClean="0"/>
+                        <a:t>My Profile</a:t>
+                      </a:r>
+                      <a:endParaRPr lang="en-US" dirty="0"/>
+                    </a:p>
+                  </a:txBody>
+                  <a:tcPr/>
+                </a:tc>
+                <a:tc>
+                  <a:txBody>
+                    <a:bodyPr/>
+                    <a:lstStyle/>
+                    <a:p>
+                      <a:pPr algn="l"/>
+                      <a:r>
+                        <a:rPr lang="en-US" dirty="0" smtClean="0"/>
+                        <a:t>Requisition</a:t>
+                      </a:r>
+                      <a:endParaRPr lang="en-US" dirty="0"/>
+                    </a:p>
+                  </a:txBody>
+                  <a:tcPr/>
+                </a:tc>
+                <a:tc gridSpan="2">
+                  <a:txBody>
+                    <a:bodyPr/>
+                    <a:lstStyle/>
+                    <a:p>
+                      <a:pPr algn="l"/>
+                      <a:r>
+                        <a:rPr lang="en-US" dirty="0" smtClean="0"/>
+                        <a:t>Vehicle Search</a:t>
+                      </a:r>
+                      <a:endParaRPr lang="en-US" dirty="0"/>
+                    </a:p>
+                  </a:txBody>
+                  <a:tcPr/>
+                </a:tc>
+                <a:tc hMerge="1">
+                  <a:txBody>
+                    <a:bodyPr/>
+                    <a:lstStyle/>
+                    <a:p>
+                      <a:endParaRPr lang="en-US"/>
+                    </a:p>
+                  </a:txBody>
+                  <a:tcPr/>
+                </a:tc>
+                <a:tc>
+                  <a:txBody>
+                    <a:bodyPr/>
+                    <a:lstStyle/>
+                    <a:p>
+                      <a:pPr algn="l"/>
+                      <a:r>
+                        <a:rPr lang="en-US" dirty="0" smtClean="0"/>
+                        <a:t>My Request</a:t>
+                      </a:r>
+                      <a:endParaRPr lang="en-US" dirty="0"/>
+                    </a:p>
+                  </a:txBody>
+                  <a:tcPr/>
+                </a:tc>
+                <a:tc>
+                  <a:txBody>
+                    <a:bodyPr/>
+                    <a:lstStyle/>
+                    <a:p>
+                      <a:pPr algn="l"/>
+                      <a:r>
+                        <a:rPr lang="en-US" dirty="0" smtClean="0"/>
+                        <a:t>Feedback</a:t>
+                      </a:r>
+                      <a:endParaRPr lang="en-US" dirty="0"/>
+                    </a:p>
+                  </a:txBody>
+                  <a:tcPr/>
+                </a:tc>
+                <a:tc>
+                  <a:txBody>
+                    <a:bodyPr/>
+                    <a:lstStyle/>
+                    <a:p>
+                      <a:pPr algn="l"/>
+                      <a:r>
+                        <a:rPr lang="en-US" dirty="0" smtClean="0"/>
+                        <a:t>Logout</a:t>
+                      </a:r>
+                      <a:endParaRPr lang="en-US" dirty="0"/>
+                    </a:p>
+                  </a:txBody>
+                  <a:tcPr/>
+                </a:tc>
+              </a:tr>
+            </a:tbl>
+          </a:graphicData>
+        </a:graphic>
+      </p:graphicFrame>
+    </p:spTree>
+    <p:extLst>
+      <p:ext uri="{BB962C8B-B14F-4D97-AF65-F5344CB8AC3E}">
+        <p14:creationId xmlns:p14="http://schemas.microsoft.com/office/powerpoint/2010/main" val="3363859786"/>
+      </p:ext>
+    </p:extLst>
+  </p:cSld>
+  <p:clrMapOvr>
+    <a:masterClrMapping/>
+  </p:clrMapOvr>
+  <p:timing>
+    <p:tnLst>
+      <p:par>
+        <p:cTn id="1" dur="indefinite" restart="never" nodeType="tmRoot"/>
+      </p:par>
+    </p:tnLst>
+  </p:timing>
+</p:sld>
+</file>
+
+<file path=ppt/slides/slide14.xml><?xml version="1.0" encoding="utf-8"?>
+<p:sld xmlns:a="http://schemas.openxmlformats.org/drawingml/2006/main" xmlns:r="http://schemas.openxmlformats.org/officeDocument/2006/relationships" xmlns:p="http://schemas.openxmlformats.org/presentationml/2006/main">
+  <p:cSld>
+    <p:bg>
+      <p:bgPr>
+        <a:solidFill>
+          <a:schemeClr val="accent4">
+            <a:lumMod val="75000"/>
+          </a:schemeClr>
+        </a:solidFill>
+        <a:effectLst/>
+      </p:bgPr>
+    </p:bg>
+    <p:spTree>
+      <p:nvGrpSpPr>
+        <p:cNvPr id="1" name=""/>
+        <p:cNvGrpSpPr/>
+        <p:nvPr/>
+      </p:nvGrpSpPr>
+      <p:grpSpPr>
+        <a:xfrm>
+          <a:off x="0" y="0"/>
+          <a:ext cx="0" cy="0"/>
+          <a:chOff x="0" y="0"/>
+          <a:chExt cx="0" cy="0"/>
+        </a:xfrm>
+      </p:grpSpPr>
+      <p:sp>
+        <p:nvSpPr>
+          <p:cNvPr id="2" name="Title 1"/>
+          <p:cNvSpPr>
+            <a:spLocks noGrp="1"/>
+          </p:cNvSpPr>
+          <p:nvPr>
+            <p:ph type="title"/>
+          </p:nvPr>
+        </p:nvSpPr>
+        <p:spPr>
+          <a:gradFill>
+            <a:gsLst>
+              <a:gs pos="0">
+                <a:schemeClr val="accent4">
+                  <a:lumMod val="89000"/>
+                </a:schemeClr>
+              </a:gs>
+              <a:gs pos="23000">
+                <a:schemeClr val="accent4">
+                  <a:lumMod val="89000"/>
+                </a:schemeClr>
+              </a:gs>
+              <a:gs pos="69000">
+                <a:schemeClr val="accent4">
+                  <a:lumMod val="75000"/>
+                </a:schemeClr>
+              </a:gs>
+              <a:gs pos="97000">
+                <a:schemeClr val="accent4">
+                  <a:lumMod val="70000"/>
+                </a:schemeClr>
+              </a:gs>
+            </a:gsLst>
+            <a:path path="circle">
+              <a:fillToRect l="50000" t="50000" r="50000" b="50000"/>
+            </a:path>
+          </a:gradFill>
+        </p:spPr>
+        <p:txBody>
+          <a:bodyPr/>
+          <a:lstStyle/>
+          <a:p>
+            <a:pPr algn="ctr"/>
+            <a:r>
+              <a:rPr lang="en-US" b="1" dirty="0" smtClean="0"/>
+              <a:t>Controller</a:t>
+            </a:r>
+            <a:r>
+              <a:rPr lang="en-US" b="1" dirty="0" smtClean="0"/>
+              <a:t> Diagram</a:t>
+            </a:r>
+            <a:endParaRPr lang="en-US" b="1" dirty="0"/>
+          </a:p>
+        </p:txBody>
+      </p:sp>
+      <p:graphicFrame>
+        <p:nvGraphicFramePr>
+          <p:cNvPr id="11" name="Content Placeholder 10"/>
+          <p:cNvGraphicFramePr>
+            <a:graphicFrameLocks noGrp="1"/>
+          </p:cNvGraphicFramePr>
+          <p:nvPr>
+            <p:ph sz="half" idx="1"/>
+            <p:extLst>
+              <p:ext uri="{D42A27DB-BD31-4B8C-83A1-F6EECF244321}">
+                <p14:modId xmlns:p14="http://schemas.microsoft.com/office/powerpoint/2010/main" val="2152530972"/>
+              </p:ext>
+            </p:extLst>
+          </p:nvPr>
+        </p:nvGraphicFramePr>
+        <p:xfrm>
+          <a:off x="838200" y="1825625"/>
+          <a:ext cx="10515600" cy="3578890"/>
+        </p:xfrm>
+        <a:graphic>
+          <a:graphicData uri="http://schemas.openxmlformats.org/drawingml/2006/table">
+            <a:tbl>
+              <a:tblPr firstRow="1" bandRow="1">
+                <a:tableStyleId>{5C22544A-7EE6-4342-B048-85BDC9FD1C3A}</a:tableStyleId>
+              </a:tblPr>
+              <a:tblGrid>
+                <a:gridCol w="1752600"/>
+                <a:gridCol w="1752600"/>
+                <a:gridCol w="1752600"/>
+                <a:gridCol w="1752600"/>
+                <a:gridCol w="1752600"/>
+                <a:gridCol w="1752600"/>
+              </a:tblGrid>
+              <a:tr h="511270">
+                <a:tc gridSpan="6">
+                  <a:txBody>
+                    <a:bodyPr/>
+                    <a:lstStyle/>
+                    <a:p>
+                      <a:pPr algn="ctr"/>
+                      <a:r>
+                        <a:rPr lang="en-US" dirty="0" smtClean="0"/>
+                        <a:t>Login</a:t>
+                      </a:r>
+                      <a:endParaRPr lang="en-US" dirty="0"/>
+                    </a:p>
+                  </a:txBody>
+                  <a:tcPr/>
+                </a:tc>
+                <a:tc hMerge="1">
+                  <a:txBody>
+                    <a:bodyPr/>
+                    <a:lstStyle/>
+                    <a:p>
+                      <a:endParaRPr lang="en-US"/>
+                    </a:p>
+                  </a:txBody>
+                  <a:tcPr/>
+                </a:tc>
+                <a:tc hMerge="1">
+                  <a:txBody>
+                    <a:bodyPr/>
+                    <a:lstStyle/>
+                    <a:p>
+                      <a:endParaRPr lang="en-US"/>
+                    </a:p>
+                  </a:txBody>
+                  <a:tcPr/>
+                </a:tc>
+                <a:tc hMerge="1">
+                  <a:txBody>
+                    <a:bodyPr/>
+                    <a:lstStyle/>
+                    <a:p>
+                      <a:endParaRPr lang="en-US"/>
+                    </a:p>
+                  </a:txBody>
+                  <a:tcPr/>
+                </a:tc>
+                <a:tc hMerge="1">
+                  <a:txBody>
+                    <a:bodyPr/>
+                    <a:lstStyle/>
+                    <a:p>
+                      <a:endParaRPr lang="en-US"/>
+                    </a:p>
+                  </a:txBody>
+                  <a:tcPr/>
+                </a:tc>
+                <a:tc hMerge="1">
+                  <a:txBody>
+                    <a:bodyPr/>
+                    <a:lstStyle/>
+                    <a:p>
+                      <a:endParaRPr lang="en-US"/>
+                    </a:p>
+                  </a:txBody>
+                  <a:tcPr/>
+                </a:tc>
+              </a:tr>
+              <a:tr h="511270">
+                <a:tc gridSpan="3">
+                  <a:txBody>
+                    <a:bodyPr/>
+                    <a:lstStyle/>
+                    <a:p>
+                      <a:pPr algn="r"/>
+                      <a:r>
+                        <a:rPr lang="en-US" dirty="0" smtClean="0"/>
+                        <a:t>Search Box:</a:t>
+                      </a:r>
+                      <a:endParaRPr lang="en-US" dirty="0"/>
+                    </a:p>
+                  </a:txBody>
+                  <a:tcPr/>
+                </a:tc>
+                <a:tc hMerge="1">
+                  <a:txBody>
+                    <a:bodyPr/>
+                    <a:lstStyle/>
+                    <a:p>
+                      <a:endParaRPr lang="en-US"/>
+                    </a:p>
+                  </a:txBody>
+                  <a:tcPr/>
+                </a:tc>
+                <a:tc hMerge="1">
+                  <a:txBody>
+                    <a:bodyPr/>
+                    <a:lstStyle/>
+                    <a:p>
+                      <a:endParaRPr lang="en-US"/>
+                    </a:p>
+                  </a:txBody>
+                  <a:tcPr/>
+                </a:tc>
+                <a:tc gridSpan="3">
+                  <a:txBody>
+                    <a:bodyPr/>
+                    <a:lstStyle/>
+                    <a:p>
+                      <a:pPr algn="l"/>
+                      <a:endParaRPr lang="en-US" dirty="0"/>
+                    </a:p>
+                  </a:txBody>
+                  <a:tcPr/>
+                </a:tc>
+                <a:tc hMerge="1">
+                  <a:txBody>
+                    <a:bodyPr/>
+                    <a:lstStyle/>
+                    <a:p>
+                      <a:endParaRPr lang="en-US"/>
+                    </a:p>
+                  </a:txBody>
+                  <a:tcPr/>
+                </a:tc>
+                <a:tc hMerge="1">
+                  <a:txBody>
+                    <a:bodyPr/>
+                    <a:lstStyle/>
+                    <a:p>
+                      <a:endParaRPr lang="en-US"/>
+                    </a:p>
+                  </a:txBody>
+                  <a:tcPr/>
+                </a:tc>
+              </a:tr>
+              <a:tr h="511270">
+                <a:tc>
+                  <a:txBody>
+                    <a:bodyPr/>
+                    <a:lstStyle/>
+                    <a:p>
+                      <a:pPr algn="l"/>
+                      <a:r>
+                        <a:rPr lang="en-US" dirty="0" smtClean="0"/>
+                        <a:t>Home</a:t>
+                      </a:r>
+                      <a:endParaRPr lang="en-US" dirty="0"/>
+                    </a:p>
+                  </a:txBody>
+                  <a:tcPr/>
+                </a:tc>
+                <a:tc>
+                  <a:txBody>
+                    <a:bodyPr/>
+                    <a:lstStyle/>
+                    <a:p>
+                      <a:pPr algn="l"/>
+                      <a:r>
+                        <a:rPr lang="en-US" dirty="0" smtClean="0"/>
+                        <a:t>Vehicle</a:t>
+                      </a:r>
+                      <a:endParaRPr lang="en-US" dirty="0"/>
+                    </a:p>
+                  </a:txBody>
+                  <a:tcPr>
+                    <a:solidFill>
+                      <a:schemeClr val="accent1">
+                        <a:lumMod val="75000"/>
+                      </a:schemeClr>
+                    </a:solidFill>
+                  </a:tcPr>
+                </a:tc>
+                <a:tc>
+                  <a:txBody>
+                    <a:bodyPr/>
+                    <a:lstStyle/>
+                    <a:p>
+                      <a:pPr algn="l"/>
+                      <a:r>
+                        <a:rPr lang="en-US" dirty="0" smtClean="0"/>
+                        <a:t>Driver</a:t>
+                      </a:r>
+                      <a:endParaRPr lang="en-US" dirty="0"/>
+                    </a:p>
+                  </a:txBody>
+                  <a:tcPr>
+                    <a:solidFill>
+                      <a:schemeClr val="accent4"/>
+                    </a:solidFill>
+                  </a:tcPr>
+                </a:tc>
+                <a:tc>
+                  <a:txBody>
+                    <a:bodyPr/>
+                    <a:lstStyle/>
+                    <a:p>
+                      <a:pPr algn="l"/>
+                      <a:r>
+                        <a:rPr lang="en-US" dirty="0" smtClean="0"/>
+                        <a:t>User</a:t>
+                      </a:r>
+                      <a:endParaRPr lang="en-US" dirty="0"/>
+                    </a:p>
+                  </a:txBody>
+                  <a:tcPr>
+                    <a:solidFill>
+                      <a:schemeClr val="accent6">
+                        <a:lumMod val="75000"/>
+                      </a:schemeClr>
+                    </a:solidFill>
+                  </a:tcPr>
+                </a:tc>
+                <a:tc>
+                  <a:txBody>
+                    <a:bodyPr/>
+                    <a:lstStyle/>
+                    <a:p>
+                      <a:pPr algn="l"/>
+                      <a:r>
+                        <a:rPr lang="en-US" dirty="0" smtClean="0"/>
+                        <a:t>Action</a:t>
+                      </a:r>
+                      <a:endParaRPr lang="en-US" dirty="0"/>
+                    </a:p>
+                  </a:txBody>
+                  <a:tcPr>
+                    <a:solidFill>
+                      <a:schemeClr val="accent2">
+                        <a:lumMod val="75000"/>
+                      </a:schemeClr>
+                    </a:solidFill>
+                  </a:tcPr>
+                </a:tc>
+                <a:tc>
+                  <a:txBody>
+                    <a:bodyPr/>
+                    <a:lstStyle/>
+                    <a:p>
+                      <a:pPr algn="l"/>
+                      <a:r>
+                        <a:rPr lang="en-US" dirty="0" smtClean="0"/>
+                        <a:t>Logout</a:t>
+                      </a:r>
+                      <a:endParaRPr lang="en-US" dirty="0"/>
+                    </a:p>
+                  </a:txBody>
+                  <a:tcPr>
+                    <a:solidFill>
+                      <a:srgbClr val="00B0F0"/>
+                    </a:solidFill>
+                  </a:tcPr>
+                </a:tc>
+              </a:tr>
+              <a:tr h="511270">
+                <a:tc gridSpan="2">
+                  <a:txBody>
+                    <a:bodyPr/>
+                    <a:lstStyle/>
+                    <a:p>
+                      <a:pPr algn="l"/>
+                      <a:r>
+                        <a:rPr lang="en-US" dirty="0" smtClean="0"/>
+                        <a:t>Vehicle Type</a:t>
+                      </a:r>
+                      <a:endParaRPr lang="en-US" dirty="0"/>
+                    </a:p>
+                  </a:txBody>
+                  <a:tcPr>
+                    <a:solidFill>
+                      <a:schemeClr val="accent1">
+                        <a:lumMod val="75000"/>
+                      </a:schemeClr>
+                    </a:solidFill>
+                  </a:tcPr>
+                </a:tc>
+                <a:tc hMerge="1">
+                  <a:txBody>
+                    <a:bodyPr/>
+                    <a:lstStyle/>
+                    <a:p>
+                      <a:pPr algn="l"/>
+                      <a:endParaRPr lang="en-US" dirty="0"/>
+                    </a:p>
+                  </a:txBody>
+                  <a:tcPr>
+                    <a:solidFill>
+                      <a:schemeClr val="accent1">
+                        <a:lumMod val="75000"/>
+                      </a:schemeClr>
+                    </a:solidFill>
+                  </a:tcPr>
+                </a:tc>
+                <a:tc gridSpan="2">
+                  <a:txBody>
+                    <a:bodyPr/>
+                    <a:lstStyle/>
+                    <a:p>
+                      <a:pPr algn="l"/>
+                      <a:r>
+                        <a:rPr lang="en-US" dirty="0" smtClean="0"/>
+                        <a:t>Add Vehicle</a:t>
+                      </a:r>
+                      <a:endParaRPr lang="en-US" dirty="0"/>
+                    </a:p>
+                  </a:txBody>
+                  <a:tcPr>
+                    <a:solidFill>
+                      <a:schemeClr val="accent1">
+                        <a:lumMod val="75000"/>
+                      </a:schemeClr>
+                    </a:solidFill>
+                  </a:tcPr>
+                </a:tc>
+                <a:tc hMerge="1">
+                  <a:txBody>
+                    <a:bodyPr/>
+                    <a:lstStyle/>
+                    <a:p>
+                      <a:pPr algn="l"/>
+                      <a:endParaRPr lang="en-US" dirty="0"/>
+                    </a:p>
+                  </a:txBody>
+                  <a:tcPr>
+                    <a:solidFill>
+                      <a:schemeClr val="accent1">
+                        <a:lumMod val="75000"/>
+                      </a:schemeClr>
+                    </a:solidFill>
+                  </a:tcPr>
+                </a:tc>
+                <a:tc gridSpan="2">
+                  <a:txBody>
+                    <a:bodyPr/>
+                    <a:lstStyle/>
+                    <a:p>
+                      <a:pPr algn="l"/>
+                      <a:r>
+                        <a:rPr lang="en-US" dirty="0" smtClean="0"/>
+                        <a:t>Vehicle List</a:t>
+                      </a:r>
+                      <a:endParaRPr lang="en-US" dirty="0"/>
+                    </a:p>
+                  </a:txBody>
+                  <a:tcPr>
+                    <a:solidFill>
+                      <a:schemeClr val="accent1">
+                        <a:lumMod val="75000"/>
+                      </a:schemeClr>
+                    </a:solidFill>
+                  </a:tcPr>
+                </a:tc>
+                <a:tc hMerge="1">
+                  <a:txBody>
+                    <a:bodyPr/>
+                    <a:lstStyle/>
+                    <a:p>
+                      <a:pPr algn="l"/>
+                      <a:endParaRPr lang="en-US" dirty="0"/>
+                    </a:p>
+                  </a:txBody>
+                  <a:tcPr>
+                    <a:solidFill>
+                      <a:schemeClr val="accent1">
+                        <a:lumMod val="75000"/>
+                      </a:schemeClr>
+                    </a:solidFill>
+                  </a:tcPr>
+                </a:tc>
+              </a:tr>
+              <a:tr h="511270">
+                <a:tc gridSpan="3">
+                  <a:txBody>
+                    <a:bodyPr/>
+                    <a:lstStyle/>
+                    <a:p>
+                      <a:pPr algn="l"/>
+                      <a:r>
+                        <a:rPr lang="en-US" dirty="0" smtClean="0"/>
+                        <a:t>Add Driver</a:t>
+                      </a:r>
+                      <a:endParaRPr lang="en-US" dirty="0"/>
+                    </a:p>
+                  </a:txBody>
+                  <a:tcPr>
+                    <a:solidFill>
+                      <a:schemeClr val="accent4"/>
+                    </a:solidFill>
+                  </a:tcPr>
+                </a:tc>
+                <a:tc hMerge="1">
+                  <a:txBody>
+                    <a:bodyPr/>
+                    <a:lstStyle/>
+                    <a:p>
+                      <a:endParaRPr lang="en-US"/>
+                    </a:p>
+                  </a:txBody>
+                  <a:tcPr/>
+                </a:tc>
+                <a:tc hMerge="1">
+                  <a:txBody>
+                    <a:bodyPr/>
+                    <a:lstStyle/>
+                    <a:p>
+                      <a:pPr algn="l"/>
+                      <a:endParaRPr lang="en-US" dirty="0"/>
+                    </a:p>
+                  </a:txBody>
+                  <a:tcPr>
+                    <a:solidFill>
+                      <a:schemeClr val="accent4"/>
+                    </a:solidFill>
+                  </a:tcPr>
+                </a:tc>
+                <a:tc gridSpan="3">
+                  <a:txBody>
+                    <a:bodyPr/>
+                    <a:lstStyle/>
+                    <a:p>
+                      <a:pPr algn="l"/>
+                      <a:r>
+                        <a:rPr lang="en-US" dirty="0" smtClean="0"/>
+                        <a:t>Driver List </a:t>
+                      </a:r>
+                    </a:p>
+                  </a:txBody>
+                  <a:tcPr>
+                    <a:solidFill>
+                      <a:schemeClr val="accent4"/>
+                    </a:solidFill>
+                  </a:tcPr>
+                </a:tc>
+                <a:tc hMerge="1">
+                  <a:txBody>
+                    <a:bodyPr/>
+                    <a:lstStyle/>
+                    <a:p>
+                      <a:pPr algn="l"/>
+                      <a:endParaRPr lang="en-US" dirty="0"/>
+                    </a:p>
+                  </a:txBody>
+                  <a:tcPr>
+                    <a:solidFill>
+                      <a:schemeClr val="accent4"/>
+                    </a:solidFill>
+                  </a:tcPr>
+                </a:tc>
+                <a:tc hMerge="1">
+                  <a:txBody>
+                    <a:bodyPr/>
+                    <a:lstStyle/>
+                    <a:p>
+                      <a:endParaRPr lang="en-US"/>
+                    </a:p>
+                  </a:txBody>
+                  <a:tcPr/>
+                </a:tc>
+              </a:tr>
+              <a:tr h="511270">
+                <a:tc gridSpan="2">
+                  <a:txBody>
+                    <a:bodyPr/>
+                    <a:lstStyle/>
+                    <a:p>
+                      <a:pPr algn="l"/>
+                      <a:r>
+                        <a:rPr lang="en-US" dirty="0" smtClean="0"/>
+                        <a:t>Add Designation</a:t>
+                      </a:r>
+                      <a:endParaRPr lang="en-US" dirty="0"/>
+                    </a:p>
+                  </a:txBody>
+                  <a:tcPr>
+                    <a:solidFill>
+                      <a:schemeClr val="accent6">
+                        <a:lumMod val="75000"/>
+                      </a:schemeClr>
+                    </a:solidFill>
+                  </a:tcPr>
+                </a:tc>
+                <a:tc hMerge="1">
+                  <a:txBody>
+                    <a:bodyPr/>
+                    <a:lstStyle/>
+                    <a:p>
+                      <a:endParaRPr lang="en-US"/>
+                    </a:p>
+                  </a:txBody>
+                  <a:tcPr/>
+                </a:tc>
+                <a:tc gridSpan="2">
+                  <a:txBody>
+                    <a:bodyPr/>
+                    <a:lstStyle/>
+                    <a:p>
+                      <a:pPr algn="l"/>
+                      <a:r>
+                        <a:rPr lang="en-US" dirty="0" smtClean="0"/>
+                        <a:t>Add </a:t>
+                      </a:r>
+                      <a:r>
+                        <a:rPr lang="en-US" baseline="0" dirty="0" smtClean="0"/>
+                        <a:t> User</a:t>
+                      </a:r>
+                      <a:endParaRPr lang="en-US" dirty="0"/>
+                    </a:p>
+                  </a:txBody>
+                  <a:tcPr>
+                    <a:solidFill>
+                      <a:schemeClr val="accent6">
+                        <a:lumMod val="75000"/>
+                      </a:schemeClr>
+                    </a:solidFill>
+                  </a:tcPr>
+                </a:tc>
+                <a:tc hMerge="1">
+                  <a:txBody>
+                    <a:bodyPr/>
+                    <a:lstStyle/>
+                    <a:p>
+                      <a:pPr algn="l"/>
+                      <a:endParaRPr lang="en-US" dirty="0" smtClean="0"/>
+                    </a:p>
+                  </a:txBody>
+                  <a:tcPr>
+                    <a:solidFill>
+                      <a:schemeClr val="accent6">
+                        <a:lumMod val="75000"/>
+                      </a:schemeClr>
+                    </a:solidFill>
+                  </a:tcPr>
+                </a:tc>
+                <a:tc gridSpan="2">
+                  <a:txBody>
+                    <a:bodyPr/>
+                    <a:lstStyle/>
+                    <a:p>
+                      <a:pPr algn="l"/>
+                      <a:r>
+                        <a:rPr lang="en-US" dirty="0" smtClean="0"/>
+                        <a:t>User List</a:t>
+                      </a:r>
+                      <a:endParaRPr lang="en-US" dirty="0"/>
+                    </a:p>
+                  </a:txBody>
+                  <a:tcPr>
+                    <a:solidFill>
+                      <a:schemeClr val="accent6">
+                        <a:lumMod val="75000"/>
+                      </a:schemeClr>
+                    </a:solidFill>
+                  </a:tcPr>
+                </a:tc>
+                <a:tc hMerge="1">
+                  <a:txBody>
+                    <a:bodyPr/>
+                    <a:lstStyle/>
+                    <a:p>
+                      <a:endParaRPr lang="en-US"/>
+                    </a:p>
+                  </a:txBody>
+                  <a:tcPr/>
+                </a:tc>
+              </a:tr>
+              <a:tr h="511270">
+                <a:tc gridSpan="6">
+                  <a:txBody>
+                    <a:bodyPr/>
+                    <a:lstStyle/>
+                    <a:p>
+                      <a:pPr algn="l"/>
+                      <a:r>
+                        <a:rPr lang="en-US" dirty="0" smtClean="0"/>
+                        <a:t>Action Details</a:t>
+                      </a:r>
+                      <a:endParaRPr lang="en-US" dirty="0"/>
+                    </a:p>
+                  </a:txBody>
+                  <a:tcPr>
+                    <a:solidFill>
+                      <a:schemeClr val="accent2">
+                        <a:lumMod val="75000"/>
+                      </a:schemeClr>
+                    </a:solidFill>
+                  </a:tcPr>
+                </a:tc>
+                <a:tc hMerge="1">
+                  <a:txBody>
+                    <a:bodyPr/>
+                    <a:lstStyle/>
+                    <a:p>
+                      <a:endParaRPr lang="en-US"/>
+                    </a:p>
+                  </a:txBody>
+                  <a:tcPr/>
+                </a:tc>
+                <a:tc hMerge="1">
+                  <a:txBody>
+                    <a:bodyPr/>
+                    <a:lstStyle/>
+                    <a:p>
+                      <a:pPr algn="l"/>
+                      <a:endParaRPr lang="en-US" dirty="0"/>
+                    </a:p>
+                  </a:txBody>
+                  <a:tcPr>
+                    <a:solidFill>
+                      <a:schemeClr val="accent2">
+                        <a:lumMod val="75000"/>
+                      </a:schemeClr>
+                    </a:solidFill>
+                  </a:tcPr>
+                </a:tc>
+                <a:tc hMerge="1">
+                  <a:txBody>
+                    <a:bodyPr/>
+                    <a:lstStyle/>
+                    <a:p>
+                      <a:endParaRPr lang="en-US"/>
+                    </a:p>
+                  </a:txBody>
+                  <a:tcPr/>
+                </a:tc>
+                <a:tc hMerge="1">
+                  <a:txBody>
+                    <a:bodyPr/>
+                    <a:lstStyle/>
+                    <a:p>
+                      <a:pPr algn="l"/>
+                      <a:endParaRPr lang="en-US" dirty="0"/>
+                    </a:p>
+                  </a:txBody>
+                  <a:tcPr>
+                    <a:solidFill>
+                      <a:schemeClr val="accent2">
+                        <a:lumMod val="75000"/>
+                      </a:schemeClr>
+                    </a:solidFill>
+                  </a:tcPr>
+                </a:tc>
+                <a:tc hMerge="1">
+                  <a:txBody>
+                    <a:bodyPr/>
+                    <a:lstStyle/>
+                    <a:p>
+                      <a:endParaRPr lang="en-US"/>
+                    </a:p>
+                  </a:txBody>
+                  <a:tcPr/>
+                </a:tc>
+              </a:tr>
+            </a:tbl>
+          </a:graphicData>
+        </a:graphic>
+      </p:graphicFrame>
+    </p:spTree>
+    <p:extLst>
+      <p:ext uri="{BB962C8B-B14F-4D97-AF65-F5344CB8AC3E}">
+        <p14:creationId xmlns:p14="http://schemas.microsoft.com/office/powerpoint/2010/main" val="3513687348"/>
+      </p:ext>
+    </p:extLst>
+  </p:cSld>
+  <p:clrMapOvr>
+    <a:masterClrMapping/>
+  </p:clrMapOvr>
+  <p:timing>
+    <p:tnLst>
+      <p:par>
+        <p:cTn id="1" dur="indefinite" restart="never" nodeType="tmRoot"/>
+      </p:par>
+    </p:tnLst>
+  </p:timing>
+</p:sld>
+</file>
+
+<file path=ppt/slides/slide15.xml><?xml version="1.0" encoding="utf-8"?>
 <p:sld xmlns:a="http://schemas.openxmlformats.org/drawingml/2006/main" xmlns:r="http://schemas.openxmlformats.org/officeDocument/2006/relationships" xmlns:p="http://schemas.openxmlformats.org/presentationml/2006/main">
   <p:cSld>
     <p:bg>
@@ -4590,7 +6298,7 @@
     </p:spTree>
     <p:extLst>
       <p:ext uri="{BB962C8B-B14F-4D97-AF65-F5344CB8AC3E}">
-        <p14:creationId xmlns:p14="http://schemas.microsoft.com/office/powerpoint/2010/main" xmlns="" val="849137660"/>
+        <p14:creationId xmlns:p14="http://schemas.microsoft.com/office/powerpoint/2010/main" val="849137660"/>
       </p:ext>
     </p:extLst>
   </p:cSld>
@@ -4748,7 +6456,7 @@
           <a:blip r:embed="rId2">
             <a:extLst>
               <a:ext uri="{28A0092B-C50C-407E-A947-70E740481C1C}">
-                <a14:useLocalDpi xmlns:a14="http://schemas.microsoft.com/office/drawing/2010/main" xmlns="" val="0"/>
+                <a14:useLocalDpi xmlns:a14="http://schemas.microsoft.com/office/drawing/2010/main" val="0"/>
               </a:ext>
             </a:extLst>
           </a:blip>
@@ -4769,7 +6477,7 @@
     </p:spTree>
     <p:extLst>
       <p:ext uri="{BB962C8B-B14F-4D97-AF65-F5344CB8AC3E}">
-        <p14:creationId xmlns:p14="http://schemas.microsoft.com/office/powerpoint/2010/main" xmlns="" val="2853610896"/>
+        <p14:creationId xmlns:p14="http://schemas.microsoft.com/office/powerpoint/2010/main" val="2853610896"/>
       </p:ext>
     </p:extLst>
   </p:cSld>
@@ -5411,7 +7119,7 @@
     </p:spTree>
     <p:extLst>
       <p:ext uri="{BB962C8B-B14F-4D97-AF65-F5344CB8AC3E}">
-        <p14:creationId xmlns:p14="http://schemas.microsoft.com/office/powerpoint/2010/main" xmlns="" val="1445338898"/>
+        <p14:creationId xmlns:p14="http://schemas.microsoft.com/office/powerpoint/2010/main" val="1445338898"/>
       </p:ext>
     </p:extLst>
   </p:cSld>
@@ -5930,7 +7638,7 @@
     </p:spTree>
     <p:extLst>
       <p:ext uri="{BB962C8B-B14F-4D97-AF65-F5344CB8AC3E}">
-        <p14:creationId xmlns:p14="http://schemas.microsoft.com/office/powerpoint/2010/main" xmlns="" val="1057660879"/>
+        <p14:creationId xmlns:p14="http://schemas.microsoft.com/office/powerpoint/2010/main" val="1057660879"/>
       </p:ext>
     </p:extLst>
   </p:cSld>
@@ -6377,7 +8085,7 @@
     </p:spTree>
     <p:extLst>
       <p:ext uri="{BB962C8B-B14F-4D97-AF65-F5344CB8AC3E}">
-        <p14:creationId xmlns:p14="http://schemas.microsoft.com/office/powerpoint/2010/main" xmlns="" val="4108372936"/>
+        <p14:creationId xmlns:p14="http://schemas.microsoft.com/office/powerpoint/2010/main" val="4108372936"/>
       </p:ext>
     </p:extLst>
   </p:cSld>
@@ -6471,11 +8179,7 @@
             </a:r>
             <a:r>
               <a:rPr lang="en-US" b="1" dirty="0" smtClean="0"/>
-              <a:t> </a:t>
-            </a:r>
-            <a:r>
-              <a:rPr lang="en-US" b="1" dirty="0" smtClean="0"/>
-              <a:t>Entry Form (Controller)</a:t>
+              <a:t> Entry Form (Controller)</a:t>
             </a:r>
             <a:endParaRPr lang="en-US" b="1" dirty="0"/>
           </a:p>
@@ -6496,7 +8200,7 @@
         </p:spPr>
         <p:txBody>
           <a:bodyPr>
-            <a:normAutofit fontScale="92500" lnSpcReduction="10000"/>
+            <a:normAutofit/>
           </a:bodyPr>
           <a:lstStyle/>
           <a:p>
@@ -6522,17 +8226,40 @@
             </a:pPr>
             <a:r>
               <a:rPr lang="en-US" dirty="0" smtClean="0"/>
+              <a:t>	Id;</a:t>
+            </a:r>
+          </a:p>
+          <a:p>
+            <a:pPr marL="0" indent="0">
+              <a:buNone/>
+            </a:pPr>
+            <a:r>
+              <a:rPr lang="en-US" dirty="0"/>
               <a:t>	</a:t>
             </a:r>
             <a:r>
-              <a:rPr lang="en-US" dirty="0" smtClean="0"/>
-              <a:t>Id</a:t>
+              <a:rPr lang="en-US" dirty="0" err="1" smtClean="0"/>
+              <a:t>TypeName</a:t>
             </a:r>
             <a:r>
               <a:rPr lang="en-US" dirty="0" smtClean="0"/>
               <a:t>;</a:t>
             </a:r>
-            <a:endParaRPr lang="en-US" dirty="0" smtClean="0"/>
+          </a:p>
+          <a:p>
+            <a:pPr marL="0" indent="0">
+              <a:buNone/>
+            </a:pPr>
+            <a:r>
+              <a:rPr lang="en-US" dirty="0" smtClean="0"/>
+              <a:t>	Description;</a:t>
+            </a:r>
+          </a:p>
+          <a:p>
+            <a:r>
+              <a:rPr lang="en-US" dirty="0" smtClean="0"/>
+              <a:t>Activity:</a:t>
+            </a:r>
           </a:p>
           <a:p>
             <a:pPr marL="0" indent="0">
@@ -6544,12 +8271,13 @@
             </a:r>
             <a:r>
               <a:rPr lang="en-US" dirty="0" err="1" smtClean="0"/>
-              <a:t>TypeName</a:t>
+              <a:t>CreateType</a:t>
             </a:r>
             <a:r>
               <a:rPr lang="en-US" dirty="0" smtClean="0"/>
-              <a:t>;</a:t>
-            </a:r>
+              <a:t>();</a:t>
+            </a:r>
+            <a:endParaRPr lang="en-US" dirty="0"/>
           </a:p>
           <a:p>
             <a:pPr marL="0" indent="0">
@@ -6560,84 +8288,8 @@
               <a:t>	</a:t>
             </a:r>
             <a:r>
-              <a:rPr lang="en-US" dirty="0" smtClean="0"/>
-              <a:t>Description;</a:t>
-            </a:r>
-          </a:p>
-          <a:p>
-            <a:r>
-              <a:rPr lang="en-US" dirty="0" smtClean="0"/>
-              <a:t>Activity:</a:t>
-            </a:r>
-          </a:p>
-          <a:p>
-            <a:pPr marL="0" indent="0">
-              <a:buNone/>
-            </a:pPr>
-            <a:r>
-              <a:rPr lang="en-US" dirty="0"/>
-              <a:t>	</a:t>
-            </a:r>
-            <a:r>
               <a:rPr lang="en-US" dirty="0" err="1" smtClean="0"/>
-              <a:t>CreateType</a:t>
-            </a:r>
-            <a:r>
-              <a:rPr lang="en-US" dirty="0" smtClean="0"/>
-              <a:t>();</a:t>
-            </a:r>
-            <a:endParaRPr lang="en-US" dirty="0"/>
-          </a:p>
-          <a:p>
-            <a:pPr marL="0" indent="0">
-              <a:buNone/>
-            </a:pPr>
-            <a:r>
-              <a:rPr lang="en-US" dirty="0" smtClean="0"/>
-              <a:t>	</a:t>
-            </a:r>
-            <a:r>
-              <a:rPr lang="en-US" dirty="0" err="1" smtClean="0"/>
-              <a:t>Type</a:t>
-            </a:r>
-            <a:r>
-              <a:rPr lang="en-US" dirty="0" err="1" smtClean="0"/>
-              <a:t>List</a:t>
-            </a:r>
-            <a:r>
-              <a:rPr lang="en-US" dirty="0" smtClean="0"/>
-              <a:t>();</a:t>
-            </a:r>
-          </a:p>
-          <a:p>
-            <a:pPr marL="0" indent="0">
-              <a:buNone/>
-            </a:pPr>
-            <a:r>
-              <a:rPr lang="en-US" dirty="0"/>
-              <a:t>	</a:t>
-            </a:r>
-            <a:r>
-              <a:rPr lang="en-US" dirty="0" err="1" smtClean="0"/>
-              <a:t>EditType</a:t>
-            </a:r>
-            <a:r>
-              <a:rPr lang="en-US" dirty="0" smtClean="0"/>
-              <a:t>();</a:t>
-            </a:r>
-            <a:endParaRPr lang="en-US" dirty="0" smtClean="0"/>
-          </a:p>
-          <a:p>
-            <a:pPr marL="0" indent="0">
-              <a:buNone/>
-            </a:pPr>
-            <a:r>
-              <a:rPr lang="en-US" dirty="0"/>
-              <a:t>	</a:t>
-            </a:r>
-            <a:r>
-              <a:rPr lang="en-US" dirty="0" err="1" smtClean="0"/>
-              <a:t>DeleteType</a:t>
+              <a:t>TypeList</a:t>
             </a:r>
             <a:r>
               <a:rPr lang="en-US" dirty="0" smtClean="0"/>
@@ -6666,7 +8318,7 @@
             <p:ph sz="half" idx="2"/>
             <p:extLst>
               <p:ext uri="{D42A27DB-BD31-4B8C-83A1-F6EECF244321}">
-                <p14:modId xmlns:p14="http://schemas.microsoft.com/office/powerpoint/2010/main" xmlns="" val="2080387988"/>
+                <p14:modId xmlns:p14="http://schemas.microsoft.com/office/powerpoint/2010/main" val="3563222527"/>
               </p:ext>
             </p:extLst>
           </p:nvPr>
@@ -6724,6 +8376,10 @@
                       <a:r>
                         <a:rPr lang="en-US" dirty="0" err="1" smtClean="0"/>
                         <a:t>TypeName</a:t>
+                      </a:r>
+                      <a:r>
+                        <a:rPr lang="en-US" dirty="0" smtClean="0"/>
+                        <a:t>*</a:t>
                       </a:r>
                       <a:endParaRPr lang="en-US" dirty="0"/>
                     </a:p>
@@ -6793,7 +8449,7 @@
     </p:spTree>
     <p:extLst>
       <p:ext uri="{BB962C8B-B14F-4D97-AF65-F5344CB8AC3E}">
-        <p14:creationId xmlns:p14="http://schemas.microsoft.com/office/powerpoint/2010/main" xmlns="" val="2831550741"/>
+        <p14:creationId xmlns:p14="http://schemas.microsoft.com/office/powerpoint/2010/main" val="2831550741"/>
       </p:ext>
     </p:extLst>
   </p:cSld>
@@ -6904,7 +8560,7 @@
         </p:spPr>
         <p:txBody>
           <a:bodyPr>
-            <a:normAutofit fontScale="70000" lnSpcReduction="20000"/>
+            <a:normAutofit fontScale="85000" lnSpcReduction="20000"/>
           </a:bodyPr>
           <a:lstStyle/>
           <a:p>
@@ -6930,7 +8586,20 @@
             </a:pPr>
             <a:r>
               <a:rPr lang="en-US" dirty="0" smtClean="0"/>
-              <a:t>	Id</a:t>
+              <a:t>	Id;</a:t>
+            </a:r>
+          </a:p>
+          <a:p>
+            <a:pPr marL="457200" lvl="1" indent="0">
+              <a:buNone/>
+            </a:pPr>
+            <a:r>
+              <a:rPr lang="en-US" dirty="0" smtClean="0"/>
+              <a:t>	 </a:t>
+            </a:r>
+            <a:r>
+              <a:rPr lang="en-US" dirty="0" err="1" smtClean="0"/>
+              <a:t>VehicleTypeId</a:t>
             </a:r>
             <a:r>
               <a:rPr lang="en-US" dirty="0" smtClean="0"/>
@@ -6938,7 +8607,7 @@
             </a:r>
           </a:p>
           <a:p>
-            <a:pPr marL="457200" lvl="1" indent="0">
+            <a:pPr marL="0" indent="0">
               <a:buNone/>
             </a:pPr>
             <a:r>
@@ -6946,18 +8615,26 @@
               <a:t>	</a:t>
             </a:r>
             <a:r>
-              <a:rPr lang="en-US" dirty="0" smtClean="0"/>
-              <a:t> </a:t>
-            </a:r>
-            <a:r>
               <a:rPr lang="en-US" dirty="0" err="1" smtClean="0"/>
-              <a:t>VehicleTypeId</a:t>
+              <a:t>RegNo</a:t>
             </a:r>
             <a:r>
               <a:rPr lang="en-US" dirty="0" smtClean="0"/>
               <a:t>;</a:t>
             </a:r>
-            <a:endParaRPr lang="en-US" dirty="0" smtClean="0"/>
+          </a:p>
+          <a:p>
+            <a:pPr marL="0" indent="0">
+              <a:buNone/>
+            </a:pPr>
+            <a:r>
+              <a:rPr lang="en-US" dirty="0"/>
+              <a:t>	</a:t>
+            </a:r>
+            <a:r>
+              <a:rPr lang="en-US" dirty="0" smtClean="0"/>
+              <a:t>Description;</a:t>
+            </a:r>
           </a:p>
           <a:p>
             <a:pPr marL="0" indent="0">
@@ -6969,7 +8646,7 @@
             </a:r>
             <a:r>
               <a:rPr lang="en-US" dirty="0" err="1" smtClean="0"/>
-              <a:t>RegNo</a:t>
+              <a:t>DriverId</a:t>
             </a:r>
             <a:r>
               <a:rPr lang="en-US" dirty="0" smtClean="0"/>
@@ -6985,13 +8662,38 @@
               <a:t>	</a:t>
             </a:r>
             <a:r>
-              <a:rPr lang="en-US" dirty="0" smtClean="0"/>
-              <a:t>Description</a:t>
+              <a:rPr lang="en-US" dirty="0" err="1" smtClean="0"/>
+              <a:t>IsDelete</a:t>
             </a:r>
             <a:r>
               <a:rPr lang="en-US" dirty="0" smtClean="0"/>
               <a:t>;</a:t>
             </a:r>
+            <a:endParaRPr lang="en-US" dirty="0"/>
+          </a:p>
+          <a:p>
+            <a:r>
+              <a:rPr lang="en-US" dirty="0"/>
+              <a:t>Activity:</a:t>
+            </a:r>
+          </a:p>
+          <a:p>
+            <a:pPr marL="0" indent="0">
+              <a:buNone/>
+            </a:pPr>
+            <a:r>
+              <a:rPr lang="en-US" dirty="0"/>
+              <a:t>	</a:t>
+            </a:r>
+            <a:r>
+              <a:rPr lang="en-US" dirty="0" err="1" smtClean="0"/>
+              <a:t>CreateVehicle</a:t>
+            </a:r>
+            <a:r>
+              <a:rPr lang="en-US" dirty="0" smtClean="0"/>
+              <a:t>();</a:t>
+            </a:r>
+            <a:endParaRPr lang="en-US" dirty="0"/>
           </a:p>
           <a:p>
             <a:pPr marL="0" indent="0">
@@ -7003,106 +8705,13 @@
             </a:r>
             <a:r>
               <a:rPr lang="en-US" dirty="0" err="1" smtClean="0"/>
-              <a:t>DriverId</a:t>
-            </a:r>
-            <a:r>
-              <a:rPr lang="en-US" dirty="0" smtClean="0"/>
-              <a:t>;</a:t>
-            </a:r>
-            <a:endParaRPr lang="en-US" dirty="0" smtClean="0"/>
-          </a:p>
-          <a:p>
-            <a:pPr marL="0" indent="0">
-              <a:buNone/>
-            </a:pPr>
-            <a:r>
-              <a:rPr lang="en-US" dirty="0"/>
-              <a:t>	</a:t>
-            </a:r>
-            <a:r>
-              <a:rPr lang="en-US" dirty="0" err="1" smtClean="0"/>
-              <a:t>IsDelete</a:t>
-            </a:r>
-            <a:r>
-              <a:rPr lang="en-US" dirty="0" smtClean="0"/>
-              <a:t>;</a:t>
-            </a:r>
-            <a:endParaRPr lang="en-US" dirty="0"/>
-          </a:p>
-          <a:p>
-            <a:r>
-              <a:rPr lang="en-US" dirty="0"/>
-              <a:t>Activity:</a:t>
-            </a:r>
-          </a:p>
-          <a:p>
-            <a:pPr marL="0" indent="0">
-              <a:buNone/>
-            </a:pPr>
-            <a:r>
-              <a:rPr lang="en-US" dirty="0"/>
-              <a:t>	</a:t>
-            </a:r>
-            <a:r>
-              <a:rPr lang="en-US" dirty="0" err="1" smtClean="0"/>
-              <a:t>CreateVehicle</a:t>
+              <a:t>VehicleList</a:t>
             </a:r>
             <a:r>
               <a:rPr lang="en-US" dirty="0" smtClean="0"/>
               <a:t>();</a:t>
             </a:r>
-            <a:endParaRPr lang="en-US" dirty="0"/>
-          </a:p>
-          <a:p>
-            <a:pPr marL="0" indent="0">
-              <a:buNone/>
-            </a:pPr>
-            <a:r>
-              <a:rPr lang="en-US" dirty="0" smtClean="0"/>
-              <a:t>	</a:t>
-            </a:r>
-            <a:r>
-              <a:rPr lang="en-US" dirty="0" err="1" smtClean="0"/>
-              <a:t>VehicleList</a:t>
-            </a:r>
-            <a:r>
-              <a:rPr lang="en-US" dirty="0" smtClean="0"/>
-              <a:t>();</a:t>
-            </a:r>
-          </a:p>
-          <a:p>
-            <a:pPr marL="0" indent="0">
-              <a:buNone/>
-            </a:pPr>
-            <a:r>
-              <a:rPr lang="en-US" dirty="0"/>
-              <a:t>	</a:t>
-            </a:r>
-            <a:r>
-              <a:rPr lang="en-US" dirty="0" err="1" smtClean="0"/>
-              <a:t>EditVehicle</a:t>
-            </a:r>
-            <a:r>
-              <a:rPr lang="en-US" dirty="0" smtClean="0"/>
-              <a:t>();</a:t>
-            </a:r>
-          </a:p>
-          <a:p>
-            <a:pPr marL="0" indent="0">
-              <a:buNone/>
-            </a:pPr>
-            <a:r>
-              <a:rPr lang="en-US" dirty="0"/>
-              <a:t>	</a:t>
-            </a:r>
-            <a:r>
-              <a:rPr lang="en-US" dirty="0" err="1" smtClean="0"/>
-              <a:t>DeleteVehicle</a:t>
-            </a:r>
-            <a:r>
-              <a:rPr lang="en-US" dirty="0" smtClean="0"/>
-              <a:t>();</a:t>
-            </a:r>
+            <a:endParaRPr lang="en-US" dirty="0" smtClean="0"/>
           </a:p>
           <a:p>
             <a:pPr marL="0" indent="0">
@@ -7125,7 +8734,7 @@
             <p:ph sz="half" idx="2"/>
             <p:extLst>
               <p:ext uri="{D42A27DB-BD31-4B8C-83A1-F6EECF244321}">
-                <p14:modId xmlns:p14="http://schemas.microsoft.com/office/powerpoint/2010/main" xmlns="" val="2080387988"/>
+                <p14:modId xmlns:p14="http://schemas.microsoft.com/office/powerpoint/2010/main" val="2080387988"/>
               </p:ext>
             </p:extLst>
           </p:nvPr>
@@ -7233,11 +8842,7 @@
                       </a:r>
                       <a:r>
                         <a:rPr lang="en-US" baseline="0" dirty="0" smtClean="0"/>
-                        <a:t> </a:t>
-                      </a:r>
-                      <a:r>
-                        <a:rPr lang="en-US" baseline="0" dirty="0" smtClean="0"/>
-                        <a:t>No*</a:t>
+                        <a:t> No*</a:t>
                       </a:r>
                       <a:endParaRPr lang="en-US" dirty="0" smtClean="0"/>
                     </a:p>
@@ -7336,7 +8941,7 @@
     </p:spTree>
     <p:extLst>
       <p:ext uri="{BB962C8B-B14F-4D97-AF65-F5344CB8AC3E}">
-        <p14:creationId xmlns:p14="http://schemas.microsoft.com/office/powerpoint/2010/main" xmlns="" val="2831550741"/>
+        <p14:creationId xmlns:p14="http://schemas.microsoft.com/office/powerpoint/2010/main" val="2831550741"/>
       </p:ext>
     </p:extLst>
   </p:cSld>
@@ -7447,7 +9052,7 @@
         </p:spPr>
         <p:txBody>
           <a:bodyPr>
-            <a:normAutofit fontScale="55000" lnSpcReduction="20000"/>
+            <a:normAutofit fontScale="70000" lnSpcReduction="20000"/>
           </a:bodyPr>
           <a:lstStyle/>
           <a:p>
@@ -7529,13 +9134,8 @@
             </a:pPr>
             <a:r>
               <a:rPr lang="en-US" dirty="0" smtClean="0"/>
-              <a:t>	</a:t>
-            </a:r>
-            <a:r>
-              <a:rPr lang="en-US" dirty="0" smtClean="0"/>
-              <a:t>NID;</a:t>
-            </a:r>
-            <a:endParaRPr lang="en-US" dirty="0" smtClean="0"/>
+              <a:t>	NID;</a:t>
+            </a:r>
           </a:p>
           <a:p>
             <a:pPr marL="0" indent="0">
@@ -7547,7 +9147,20 @@
             </a:r>
             <a:r>
               <a:rPr lang="en-US" dirty="0" smtClean="0"/>
-              <a:t>Address</a:t>
+              <a:t>Address;</a:t>
+            </a:r>
+          </a:p>
+          <a:p>
+            <a:pPr marL="0" indent="0">
+              <a:buNone/>
+            </a:pPr>
+            <a:r>
+              <a:rPr lang="en-US" dirty="0" smtClean="0"/>
+              <a:t>	</a:t>
+            </a:r>
+            <a:r>
+              <a:rPr lang="en-US" dirty="0" err="1" smtClean="0"/>
+              <a:t>VehicleId</a:t>
             </a:r>
             <a:r>
               <a:rPr lang="en-US" dirty="0" smtClean="0"/>
@@ -7559,106 +9172,54 @@
               <a:buNone/>
             </a:pPr>
             <a:r>
+              <a:rPr lang="en-US" dirty="0"/>
+              <a:t>	</a:t>
+            </a:r>
+            <a:r>
+              <a:rPr lang="en-US" dirty="0" err="1" smtClean="0"/>
+              <a:t>IsDelete</a:t>
+            </a:r>
+            <a:r>
+              <a:rPr lang="en-US" dirty="0" smtClean="0"/>
+              <a:t>;</a:t>
+            </a:r>
+            <a:endParaRPr lang="en-US" dirty="0"/>
+          </a:p>
+          <a:p>
+            <a:r>
+              <a:rPr lang="en-US" dirty="0"/>
+              <a:t>Activity:</a:t>
+            </a:r>
+          </a:p>
+          <a:p>
+            <a:pPr marL="0" indent="0">
+              <a:buNone/>
+            </a:pPr>
+            <a:r>
+              <a:rPr lang="en-US" dirty="0"/>
+              <a:t>	</a:t>
+            </a:r>
+            <a:r>
+              <a:rPr lang="en-US" dirty="0" err="1" smtClean="0"/>
+              <a:t>CreateDriver</a:t>
+            </a:r>
+            <a:r>
+              <a:rPr lang="en-US" dirty="0" smtClean="0"/>
+              <a:t>();</a:t>
+            </a:r>
+            <a:endParaRPr lang="en-US" dirty="0"/>
+          </a:p>
+          <a:p>
+            <a:pPr marL="0" indent="0">
+              <a:buNone/>
+            </a:pPr>
+            <a:r>
               <a:rPr lang="en-US" dirty="0" smtClean="0"/>
               <a:t>	</a:t>
             </a:r>
             <a:r>
               <a:rPr lang="en-US" dirty="0" err="1" smtClean="0"/>
-              <a:t>VehicleId</a:t>
-            </a:r>
-            <a:r>
-              <a:rPr lang="en-US" dirty="0" smtClean="0"/>
-              <a:t>;</a:t>
-            </a:r>
-            <a:endParaRPr lang="en-US" dirty="0" smtClean="0"/>
-          </a:p>
-          <a:p>
-            <a:pPr marL="0" indent="0">
-              <a:buNone/>
-            </a:pPr>
-            <a:r>
-              <a:rPr lang="en-US" dirty="0"/>
-              <a:t>	</a:t>
-            </a:r>
-            <a:r>
-              <a:rPr lang="en-US" dirty="0" err="1" smtClean="0"/>
-              <a:t>IsDelete</a:t>
-            </a:r>
-            <a:r>
-              <a:rPr lang="en-US" dirty="0" smtClean="0"/>
-              <a:t>;</a:t>
-            </a:r>
-            <a:endParaRPr lang="en-US" dirty="0"/>
-          </a:p>
-          <a:p>
-            <a:r>
-              <a:rPr lang="en-US" dirty="0"/>
-              <a:t>Activity:</a:t>
-            </a:r>
-          </a:p>
-          <a:p>
-            <a:pPr marL="0" indent="0">
-              <a:buNone/>
-            </a:pPr>
-            <a:r>
-              <a:rPr lang="en-US" dirty="0"/>
-              <a:t>	</a:t>
-            </a:r>
-            <a:r>
-              <a:rPr lang="en-US" dirty="0" err="1" smtClean="0"/>
-              <a:t>CreateDriver</a:t>
-            </a:r>
-            <a:r>
-              <a:rPr lang="en-US" dirty="0" smtClean="0"/>
-              <a:t>();</a:t>
-            </a:r>
-            <a:endParaRPr lang="en-US" dirty="0"/>
-          </a:p>
-          <a:p>
-            <a:pPr marL="0" indent="0">
-              <a:buNone/>
-            </a:pPr>
-            <a:r>
-              <a:rPr lang="en-US" dirty="0" smtClean="0"/>
-              <a:t>	</a:t>
-            </a:r>
-            <a:r>
-              <a:rPr lang="en-US" dirty="0" err="1" smtClean="0"/>
               <a:t>DriverList</a:t>
-            </a:r>
-            <a:r>
-              <a:rPr lang="en-US" dirty="0" smtClean="0"/>
-              <a:t>();</a:t>
-            </a:r>
-          </a:p>
-          <a:p>
-            <a:pPr marL="0" indent="0">
-              <a:buNone/>
-            </a:pPr>
-            <a:r>
-              <a:rPr lang="en-US" dirty="0"/>
-              <a:t>	</a:t>
-            </a:r>
-            <a:r>
-              <a:rPr lang="en-US" dirty="0" err="1" smtClean="0"/>
-              <a:t>EditDriver</a:t>
-            </a:r>
-            <a:r>
-              <a:rPr lang="en-US" dirty="0" smtClean="0"/>
-              <a:t>();</a:t>
-            </a:r>
-          </a:p>
-          <a:p>
-            <a:pPr marL="0" indent="0">
-              <a:buNone/>
-            </a:pPr>
-            <a:r>
-              <a:rPr lang="en-US" dirty="0"/>
-              <a:t>	</a:t>
-            </a:r>
-            <a:r>
-              <a:rPr lang="en-US" dirty="0" err="1" smtClean="0"/>
-              <a:t>DeleteDriver</a:t>
             </a:r>
             <a:r>
               <a:rPr lang="en-US" dirty="0" smtClean="0"/>
@@ -7686,7 +9247,7 @@
             <p:ph sz="half" idx="2"/>
             <p:extLst>
               <p:ext uri="{D42A27DB-BD31-4B8C-83A1-F6EECF244321}">
-                <p14:modId xmlns:p14="http://schemas.microsoft.com/office/powerpoint/2010/main" xmlns="" val="2092718394"/>
+                <p14:modId xmlns:p14="http://schemas.microsoft.com/office/powerpoint/2010/main" val="2092718394"/>
               </p:ext>
             </p:extLst>
           </p:nvPr>
@@ -7864,7 +9425,6 @@
                         <a:rPr lang="en-US" dirty="0" smtClean="0"/>
                         <a:t>NID</a:t>
                       </a:r>
-                      <a:endParaRPr lang="en-US" dirty="0" smtClean="0"/>
                     </a:p>
                     <a:p>
                       <a:endParaRPr lang="en-US" dirty="0"/>
@@ -7942,7 +9502,7 @@
     </p:spTree>
     <p:extLst>
       <p:ext uri="{BB962C8B-B14F-4D97-AF65-F5344CB8AC3E}">
-        <p14:creationId xmlns:p14="http://schemas.microsoft.com/office/powerpoint/2010/main" xmlns="" val="2907444629"/>
+        <p14:creationId xmlns:p14="http://schemas.microsoft.com/office/powerpoint/2010/main" val="2907444629"/>
       </p:ext>
     </p:extLst>
   </p:cSld>
@@ -8032,15 +9592,15 @@
             <a:pPr algn="ctr"/>
             <a:r>
               <a:rPr lang="en-US" b="1" dirty="0" smtClean="0"/>
-              <a:t>User Registration </a:t>
+              <a:t>User </a:t>
             </a:r>
             <a:r>
               <a:rPr lang="en-US" b="1" dirty="0" smtClean="0"/>
-              <a:t>Form </a:t>
+              <a:t>Designation </a:t>
             </a:r>
             <a:r>
               <a:rPr lang="en-US" b="1" dirty="0" smtClean="0"/>
-              <a:t>(Controller)</a:t>
+              <a:t>Form (Controller)</a:t>
             </a:r>
             <a:endParaRPr lang="en-US" b="1" dirty="0"/>
           </a:p>
@@ -8061,7 +9621,7 @@
         </p:spPr>
         <p:txBody>
           <a:bodyPr>
-            <a:normAutofit fontScale="70000" lnSpcReduction="20000"/>
+            <a:normAutofit/>
           </a:bodyPr>
           <a:lstStyle/>
           <a:p>
@@ -8071,7 +9631,7 @@
             </a:r>
             <a:r>
               <a:rPr lang="en-US" dirty="0" err="1" smtClean="0"/>
-              <a:t>UserInfo</a:t>
+              <a:t>UserDesisgnation</a:t>
             </a:r>
             <a:endParaRPr lang="en-US" dirty="0"/>
           </a:p>
@@ -8087,20 +9647,15 @@
             </a:pPr>
             <a:r>
               <a:rPr lang="en-US" dirty="0" smtClean="0"/>
-              <a:t>	Id;</a:t>
-            </a:r>
-          </a:p>
-          <a:p>
-            <a:pPr marL="0" indent="0">
-              <a:buNone/>
-            </a:pPr>
-            <a:r>
-              <a:rPr lang="en-US" dirty="0"/>
-              <a:t>	Name;</a:t>
-            </a:r>
-          </a:p>
-          <a:p>
-            <a:pPr marL="0" indent="0">
+              <a:t>	Id</a:t>
+            </a:r>
+            <a:r>
+              <a:rPr lang="en-US" dirty="0" smtClean="0"/>
+              <a:t>;</a:t>
+            </a:r>
+          </a:p>
+          <a:p>
+            <a:pPr marL="457200" lvl="1" indent="0">
               <a:buNone/>
             </a:pPr>
             <a:r>
@@ -8109,7 +9664,18 @@
             </a:r>
             <a:r>
               <a:rPr lang="en-US" dirty="0" smtClean="0"/>
-              <a:t>Designation;</a:t>
+              <a:t>Designation</a:t>
+            </a:r>
+            <a:r>
+              <a:rPr lang="en-US" dirty="0" smtClean="0"/>
+              <a:t>;</a:t>
+            </a:r>
+            <a:endParaRPr lang="en-US" dirty="0"/>
+          </a:p>
+          <a:p>
+            <a:r>
+              <a:rPr lang="en-US" dirty="0"/>
+              <a:t>Activity:</a:t>
             </a:r>
           </a:p>
           <a:p>
@@ -8121,10 +9687,13 @@
               <a:t>	</a:t>
             </a:r>
             <a:r>
+              <a:rPr lang="en-US" dirty="0" err="1" smtClean="0"/>
+              <a:t>CreateDesignation</a:t>
+            </a:r>
+            <a:r>
               <a:rPr lang="en-US" dirty="0" smtClean="0"/>
-              <a:t>Email;</a:t>
-            </a:r>
-            <a:endParaRPr lang="en-US" dirty="0"/>
+              <a:t>();</a:t>
+            </a:r>
           </a:p>
           <a:p>
             <a:pPr marL="0" indent="0">
@@ -8135,89 +9704,14 @@
               <a:t>	</a:t>
             </a:r>
             <a:r>
-              <a:rPr lang="en-US" dirty="0" err="1"/>
-              <a:t>ContactNo</a:t>
-            </a:r>
-            <a:r>
-              <a:rPr lang="en-US" dirty="0"/>
-              <a:t>;</a:t>
-            </a:r>
-          </a:p>
-          <a:p>
-            <a:pPr marL="0" indent="0">
-              <a:buNone/>
-            </a:pPr>
-            <a:r>
-              <a:rPr lang="en-US" dirty="0"/>
-              <a:t>	Logo/Image;</a:t>
-            </a:r>
-          </a:p>
-          <a:p>
-            <a:pPr marL="0" indent="0">
-              <a:buNone/>
-            </a:pPr>
-            <a:r>
-              <a:rPr lang="en-US" dirty="0"/>
-              <a:t>	Address;</a:t>
-            </a:r>
-          </a:p>
-          <a:p>
-            <a:r>
-              <a:rPr lang="en-US" dirty="0"/>
-              <a:t>Activity:</a:t>
-            </a:r>
-          </a:p>
-          <a:p>
-            <a:pPr marL="0" indent="0">
-              <a:buNone/>
-            </a:pPr>
-            <a:r>
-              <a:rPr lang="en-US" dirty="0"/>
-              <a:t>	</a:t>
-            </a:r>
-            <a:r>
               <a:rPr lang="en-US" dirty="0" err="1" smtClean="0"/>
-              <a:t>CreateUser</a:t>
+              <a:t>DesignationList</a:t>
             </a:r>
             <a:r>
               <a:rPr lang="en-US" dirty="0" smtClean="0"/>
               <a:t>();</a:t>
             </a:r>
-            <a:endParaRPr lang="en-US" dirty="0"/>
-          </a:p>
-          <a:p>
-            <a:pPr marL="0" indent="0">
-              <a:buNone/>
-            </a:pPr>
-            <a:r>
-              <a:rPr lang="en-US" dirty="0" smtClean="0"/>
-              <a:t>	</a:t>
-            </a:r>
-            <a:r>
-              <a:rPr lang="en-US" dirty="0" err="1" smtClean="0"/>
-              <a:t>GetRegInfo</a:t>
-            </a:r>
-            <a:r>
-              <a:rPr lang="en-US" dirty="0" smtClean="0"/>
-              <a:t>();</a:t>
-            </a:r>
-          </a:p>
-          <a:p>
-            <a:pPr marL="0" indent="0">
-              <a:buNone/>
-            </a:pPr>
-            <a:r>
-              <a:rPr lang="en-US" dirty="0"/>
-              <a:t>	</a:t>
-            </a:r>
-            <a:r>
-              <a:rPr lang="en-US" dirty="0" err="1" smtClean="0"/>
-              <a:t>EditInfo</a:t>
-            </a:r>
-            <a:r>
-              <a:rPr lang="en-US" dirty="0" smtClean="0"/>
-              <a:t>();</a:t>
-            </a:r>
+            <a:endParaRPr lang="en-US" dirty="0" smtClean="0"/>
           </a:p>
           <a:p>
             <a:pPr marL="0" indent="0">
@@ -8240,14 +9734,14 @@
             <p:ph sz="half" idx="2"/>
             <p:extLst>
               <p:ext uri="{D42A27DB-BD31-4B8C-83A1-F6EECF244321}">
-                <p14:modId xmlns:p14="http://schemas.microsoft.com/office/powerpoint/2010/main" xmlns="" val="1020137389"/>
+                <p14:modId xmlns:p14="http://schemas.microsoft.com/office/powerpoint/2010/main" val="2434012625"/>
               </p:ext>
             </p:extLst>
           </p:nvPr>
         </p:nvGraphicFramePr>
         <p:xfrm>
           <a:off x="6172200" y="1825625"/>
-          <a:ext cx="5181600" cy="4054668"/>
+          <a:ext cx="5181600" cy="2027334"/>
         </p:xfrm>
         <a:graphic>
           <a:graphicData uri="http://schemas.openxmlformats.org/drawingml/2006/table">
@@ -8297,7 +9791,7 @@
                     <a:p>
                       <a:r>
                         <a:rPr lang="en-US" dirty="0" smtClean="0"/>
-                        <a:t>Name</a:t>
+                        <a:t>Designation</a:t>
                       </a:r>
                       <a:endParaRPr lang="en-US" dirty="0"/>
                     </a:p>
@@ -8323,85 +9817,7 @@
                     <a:p>
                       <a:r>
                         <a:rPr lang="en-US" dirty="0" smtClean="0"/>
-                        <a:t>Designation</a:t>
-                      </a:r>
-                      <a:endParaRPr lang="en-US" dirty="0"/>
-                    </a:p>
-                  </a:txBody>
-                  <a:tcPr/>
-                </a:tc>
-                <a:tc>
-                  <a:txBody>
-                    <a:bodyPr/>
-                    <a:lstStyle/>
-                    <a:p>
-                      <a:endParaRPr lang="en-US" dirty="0"/>
-                    </a:p>
-                  </a:txBody>
-                  <a:tcPr/>
-                </a:tc>
-              </a:tr>
-              <a:tr h="675778">
-                <a:tc>
-                  <a:txBody>
-                    <a:bodyPr/>
-                    <a:lstStyle/>
-                    <a:p>
-                      <a:r>
-                        <a:rPr lang="en-US" dirty="0" smtClean="0"/>
-                        <a:t>Email</a:t>
-                      </a:r>
-                      <a:endParaRPr lang="en-US" dirty="0"/>
-                    </a:p>
-                  </a:txBody>
-                  <a:tcPr/>
-                </a:tc>
-                <a:tc>
-                  <a:txBody>
-                    <a:bodyPr/>
-                    <a:lstStyle/>
-                    <a:p>
-                      <a:endParaRPr lang="en-US" dirty="0"/>
-                    </a:p>
-                  </a:txBody>
-                  <a:tcPr/>
-                </a:tc>
-              </a:tr>
-              <a:tr h="675778">
-                <a:tc>
-                  <a:txBody>
-                    <a:bodyPr/>
-                    <a:lstStyle/>
-                    <a:p>
-                      <a:r>
-                        <a:rPr lang="en-US" dirty="0" smtClean="0"/>
-                        <a:t>Mobile N</a:t>
-                      </a:r>
-                      <a:endParaRPr lang="en-US" dirty="0"/>
-                    </a:p>
-                  </a:txBody>
-                  <a:tcPr/>
-                </a:tc>
-                <a:tc>
-                  <a:txBody>
-                    <a:bodyPr/>
-                    <a:lstStyle/>
-                    <a:p>
-                      <a:endParaRPr lang="en-US" dirty="0"/>
-                    </a:p>
-                  </a:txBody>
-                  <a:tcPr/>
-                </a:tc>
-              </a:tr>
-              <a:tr h="675778">
-                <a:tc>
-                  <a:txBody>
-                    <a:bodyPr/>
-                    <a:lstStyle/>
-                    <a:p>
-                      <a:r>
-                        <a:rPr lang="en-US" dirty="0" smtClean="0"/>
-                        <a:t>Office Address</a:t>
+                        <a:t>Description</a:t>
                       </a:r>
                       <a:endParaRPr lang="en-US" dirty="0"/>
                     </a:p>
@@ -8426,7 +9842,7 @@
     </p:spTree>
     <p:extLst>
       <p:ext uri="{BB962C8B-B14F-4D97-AF65-F5344CB8AC3E}">
-        <p14:creationId xmlns:p14="http://schemas.microsoft.com/office/powerpoint/2010/main" xmlns="" val="2198716805"/>
+        <p14:creationId xmlns:p14="http://schemas.microsoft.com/office/powerpoint/2010/main" val="3932370638"/>
       </p:ext>
     </p:extLst>
   </p:cSld>
@@ -8698,7 +10114,7 @@
   <a:extraClrSchemeLst/>
   <a:extLst>
     <a:ext uri="{05A4C25C-085E-4340-85A3-A5531E510DB2}">
-      <thm15:themeFamily xmlns:thm15="http://schemas.microsoft.com/office/thememl/2012/main" xmlns="" name="Office Theme" id="{62F939B6-93AF-4DB8-9C6B-D6C7DFDC589F}" vid="{4A3C46E8-61CC-4603-A589-7422A47A8E4A}"/>
+      <thm15:themeFamily xmlns:thm15="http://schemas.microsoft.com/office/thememl/2012/main" name="Office Theme" id="{62F939B6-93AF-4DB8-9C6B-D6C7DFDC589F}" vid="{4A3C46E8-61CC-4603-A589-7422A47A8E4A}"/>
     </a:ext>
   </a:extLst>
 </a:theme>

</xml_diff>